<commit_message>
Fleshing out the community involvement slides
</commit_message>
<xml_diff>
--- a/docs/cna/Becoming_a_CNA.pptx
+++ b/docs/cna/Becoming_a_CNA.pptx
@@ -5,7 +5,7 @@
     <p:sldMasterId id="2147483660" r:id="rId5"/>
   </p:sldMasterIdLst>
   <p:notesMasterIdLst>
-    <p:notesMasterId r:id="rId46"/>
+    <p:notesMasterId r:id="rId47"/>
   </p:notesMasterIdLst>
   <p:sldIdLst>
     <p:sldId id="256" r:id="rId6"/>
@@ -36,18 +36,19 @@
     <p:sldId id="262" r:id="rId31"/>
     <p:sldId id="299" r:id="rId32"/>
     <p:sldId id="260" r:id="rId33"/>
-    <p:sldId id="263" r:id="rId34"/>
-    <p:sldId id="286" r:id="rId35"/>
-    <p:sldId id="287" r:id="rId36"/>
-    <p:sldId id="288" r:id="rId37"/>
-    <p:sldId id="301" r:id="rId38"/>
-    <p:sldId id="290" r:id="rId39"/>
-    <p:sldId id="291" r:id="rId40"/>
-    <p:sldId id="303" r:id="rId41"/>
-    <p:sldId id="302" r:id="rId42"/>
-    <p:sldId id="304" r:id="rId43"/>
-    <p:sldId id="305" r:id="rId44"/>
-    <p:sldId id="294" r:id="rId45"/>
+    <p:sldId id="307" r:id="rId34"/>
+    <p:sldId id="263" r:id="rId35"/>
+    <p:sldId id="286" r:id="rId36"/>
+    <p:sldId id="287" r:id="rId37"/>
+    <p:sldId id="288" r:id="rId38"/>
+    <p:sldId id="301" r:id="rId39"/>
+    <p:sldId id="290" r:id="rId40"/>
+    <p:sldId id="291" r:id="rId41"/>
+    <p:sldId id="303" r:id="rId42"/>
+    <p:sldId id="302" r:id="rId43"/>
+    <p:sldId id="304" r:id="rId44"/>
+    <p:sldId id="305" r:id="rId45"/>
+    <p:sldId id="294" r:id="rId46"/>
   </p:sldIdLst>
   <p:sldSz cx="9144000" cy="6858000" type="screen4x3"/>
   <p:notesSz cx="6858000" cy="9144000"/>
@@ -191,163 +192,6 @@
 </p:cmAuthorLst>
 </file>
 
-<file path=ppt/changesInfos/changesInfo1.xml><?xml version="1.0" encoding="utf-8"?>
-<pc:chgInfo xmlns:a="http://schemas.openxmlformats.org/drawingml/2006/main" xmlns:r="http://schemas.openxmlformats.org/officeDocument/2006/relationships" xmlns:ac="http://schemas.microsoft.com/office/drawing/2013/main/command" xmlns:pc="http://schemas.microsoft.com/office/powerpoint/2013/main/command">
-  <pc:docChgLst>
-    <pc:chgData name="Robert Roberge" userId="7d3ba1ecd22967b8" providerId="LiveId" clId="{59F936DB-1A8D-4E41-96E3-B57B24128CB9}"/>
-    <pc:docChg chg="undo custSel modSld">
-      <pc:chgData name="Robert Roberge" userId="7d3ba1ecd22967b8" providerId="LiveId" clId="{59F936DB-1A8D-4E41-96E3-B57B24128CB9}" dt="2019-02-14T17:18:22.270" v="39" actId="5793"/>
-      <pc:docMkLst>
-        <pc:docMk/>
-      </pc:docMkLst>
-      <pc:sldChg chg="modSp">
-        <pc:chgData name="Robert Roberge" userId="7d3ba1ecd22967b8" providerId="LiveId" clId="{59F936DB-1A8D-4E41-96E3-B57B24128CB9}" dt="2019-02-12T14:53:46.953" v="10" actId="20577"/>
-        <pc:sldMkLst>
-          <pc:docMk/>
-          <pc:sldMk cId="3362527555" sldId="257"/>
-        </pc:sldMkLst>
-        <pc:spChg chg="mod">
-          <ac:chgData name="Robert Roberge" userId="7d3ba1ecd22967b8" providerId="LiveId" clId="{59F936DB-1A8D-4E41-96E3-B57B24128CB9}" dt="2019-02-12T14:53:46.953" v="10" actId="20577"/>
-          <ac:spMkLst>
-            <pc:docMk/>
-            <pc:sldMk cId="3362527555" sldId="257"/>
-            <ac:spMk id="3" creationId="{00000000-0000-0000-0000-000000000000}"/>
-          </ac:spMkLst>
-        </pc:spChg>
-      </pc:sldChg>
-      <pc:sldChg chg="modSp">
-        <pc:chgData name="Robert Roberge" userId="7d3ba1ecd22967b8" providerId="LiveId" clId="{59F936DB-1A8D-4E41-96E3-B57B24128CB9}" dt="2019-02-12T14:56:50.027" v="17" actId="20577"/>
-        <pc:sldMkLst>
-          <pc:docMk/>
-          <pc:sldMk cId="2696345968" sldId="262"/>
-        </pc:sldMkLst>
-        <pc:spChg chg="mod">
-          <ac:chgData name="Robert Roberge" userId="7d3ba1ecd22967b8" providerId="LiveId" clId="{59F936DB-1A8D-4E41-96E3-B57B24128CB9}" dt="2019-02-12T14:56:50.027" v="17" actId="20577"/>
-          <ac:spMkLst>
-            <pc:docMk/>
-            <pc:sldMk cId="2696345968" sldId="262"/>
-            <ac:spMk id="2" creationId="{00000000-0000-0000-0000-000000000000}"/>
-          </ac:spMkLst>
-        </pc:spChg>
-      </pc:sldChg>
-      <pc:sldChg chg="modSp">
-        <pc:chgData name="Robert Roberge" userId="7d3ba1ecd22967b8" providerId="LiveId" clId="{59F936DB-1A8D-4E41-96E3-B57B24128CB9}" dt="2019-02-14T17:18:22.270" v="39" actId="5793"/>
-        <pc:sldMkLst>
-          <pc:docMk/>
-          <pc:sldMk cId="2089681186" sldId="266"/>
-        </pc:sldMkLst>
-        <pc:spChg chg="mod">
-          <ac:chgData name="Robert Roberge" userId="7d3ba1ecd22967b8" providerId="LiveId" clId="{59F936DB-1A8D-4E41-96E3-B57B24128CB9}" dt="2019-02-14T17:18:22.270" v="39" actId="5793"/>
-          <ac:spMkLst>
-            <pc:docMk/>
-            <pc:sldMk cId="2089681186" sldId="266"/>
-            <ac:spMk id="3" creationId="{00000000-0000-0000-0000-000000000000}"/>
-          </ac:spMkLst>
-        </pc:spChg>
-      </pc:sldChg>
-      <pc:sldChg chg="modSp">
-        <pc:chgData name="Robert Roberge" userId="7d3ba1ecd22967b8" providerId="LiveId" clId="{59F936DB-1A8D-4E41-96E3-B57B24128CB9}" dt="2019-02-12T15:02:40.609" v="29" actId="20577"/>
-        <pc:sldMkLst>
-          <pc:docMk/>
-          <pc:sldMk cId="1292798470" sldId="267"/>
-        </pc:sldMkLst>
-        <pc:spChg chg="mod">
-          <ac:chgData name="Robert Roberge" userId="7d3ba1ecd22967b8" providerId="LiveId" clId="{59F936DB-1A8D-4E41-96E3-B57B24128CB9}" dt="2019-02-12T15:02:40.609" v="29" actId="20577"/>
-          <ac:spMkLst>
-            <pc:docMk/>
-            <pc:sldMk cId="1292798470" sldId="267"/>
-            <ac:spMk id="3" creationId="{00000000-0000-0000-0000-000000000000}"/>
-          </ac:spMkLst>
-        </pc:spChg>
-      </pc:sldChg>
-      <pc:sldChg chg="modSp">
-        <pc:chgData name="Robert Roberge" userId="7d3ba1ecd22967b8" providerId="LiveId" clId="{59F936DB-1A8D-4E41-96E3-B57B24128CB9}" dt="2019-02-12T15:03:00.508" v="30" actId="113"/>
-        <pc:sldMkLst>
-          <pc:docMk/>
-          <pc:sldMk cId="3933356961" sldId="272"/>
-        </pc:sldMkLst>
-        <pc:spChg chg="mod">
-          <ac:chgData name="Robert Roberge" userId="7d3ba1ecd22967b8" providerId="LiveId" clId="{59F936DB-1A8D-4E41-96E3-B57B24128CB9}" dt="2019-02-12T14:54:58.986" v="13" actId="20577"/>
-          <ac:spMkLst>
-            <pc:docMk/>
-            <pc:sldMk cId="3933356961" sldId="272"/>
-            <ac:spMk id="2" creationId="{00000000-0000-0000-0000-000000000000}"/>
-          </ac:spMkLst>
-        </pc:spChg>
-        <pc:spChg chg="mod">
-          <ac:chgData name="Robert Roberge" userId="7d3ba1ecd22967b8" providerId="LiveId" clId="{59F936DB-1A8D-4E41-96E3-B57B24128CB9}" dt="2019-02-12T15:03:00.508" v="30" actId="113"/>
-          <ac:spMkLst>
-            <pc:docMk/>
-            <pc:sldMk cId="3933356961" sldId="272"/>
-            <ac:spMk id="3" creationId="{00000000-0000-0000-0000-000000000000}"/>
-          </ac:spMkLst>
-        </pc:spChg>
-      </pc:sldChg>
-      <pc:sldChg chg="modSp">
-        <pc:chgData name="Robert Roberge" userId="7d3ba1ecd22967b8" providerId="LiveId" clId="{59F936DB-1A8D-4E41-96E3-B57B24128CB9}" dt="2019-02-12T14:55:50.802" v="14" actId="20577"/>
-        <pc:sldMkLst>
-          <pc:docMk/>
-          <pc:sldMk cId="1105725942" sldId="275"/>
-        </pc:sldMkLst>
-        <pc:spChg chg="mod">
-          <ac:chgData name="Robert Roberge" userId="7d3ba1ecd22967b8" providerId="LiveId" clId="{59F936DB-1A8D-4E41-96E3-B57B24128CB9}" dt="2019-02-12T14:55:50.802" v="14" actId="20577"/>
-          <ac:spMkLst>
-            <pc:docMk/>
-            <pc:sldMk cId="1105725942" sldId="275"/>
-            <ac:spMk id="2" creationId="{00000000-0000-0000-0000-000000000000}"/>
-          </ac:spMkLst>
-        </pc:spChg>
-      </pc:sldChg>
-      <pc:sldChg chg="modSp">
-        <pc:chgData name="Robert Roberge" userId="7d3ba1ecd22967b8" providerId="LiveId" clId="{59F936DB-1A8D-4E41-96E3-B57B24128CB9}" dt="2019-02-14T17:17:26.457" v="36" actId="20577"/>
-        <pc:sldMkLst>
-          <pc:docMk/>
-          <pc:sldMk cId="591337851" sldId="295"/>
-        </pc:sldMkLst>
-        <pc:spChg chg="mod">
-          <ac:chgData name="Robert Roberge" userId="7d3ba1ecd22967b8" providerId="LiveId" clId="{59F936DB-1A8D-4E41-96E3-B57B24128CB9}" dt="2019-02-14T17:17:26.457" v="36" actId="20577"/>
-          <ac:spMkLst>
-            <pc:docMk/>
-            <pc:sldMk cId="591337851" sldId="295"/>
-            <ac:spMk id="3" creationId="{00000000-0000-0000-0000-000000000000}"/>
-          </ac:spMkLst>
-        </pc:spChg>
-      </pc:sldChg>
-      <pc:sldChg chg="modSp">
-        <pc:chgData name="Robert Roberge" userId="7d3ba1ecd22967b8" providerId="LiveId" clId="{59F936DB-1A8D-4E41-96E3-B57B24128CB9}" dt="2019-02-12T14:59:08.257" v="23" actId="20577"/>
-        <pc:sldMkLst>
-          <pc:docMk/>
-          <pc:sldMk cId="190676031" sldId="296"/>
-        </pc:sldMkLst>
-        <pc:spChg chg="mod">
-          <ac:chgData name="Robert Roberge" userId="7d3ba1ecd22967b8" providerId="LiveId" clId="{59F936DB-1A8D-4E41-96E3-B57B24128CB9}" dt="2019-02-12T14:59:08.257" v="23" actId="20577"/>
-          <ac:spMkLst>
-            <pc:docMk/>
-            <pc:sldMk cId="190676031" sldId="296"/>
-            <ac:spMk id="3" creationId="{00000000-0000-0000-0000-000000000000}"/>
-          </ac:spMkLst>
-        </pc:spChg>
-      </pc:sldChg>
-      <pc:sldChg chg="modSp">
-        <pc:chgData name="Robert Roberge" userId="7d3ba1ecd22967b8" providerId="LiveId" clId="{59F936DB-1A8D-4E41-96E3-B57B24128CB9}" dt="2019-02-12T15:02:15.271" v="24" actId="20577"/>
-        <pc:sldMkLst>
-          <pc:docMk/>
-          <pc:sldMk cId="3191215242" sldId="297"/>
-        </pc:sldMkLst>
-        <pc:spChg chg="mod">
-          <ac:chgData name="Robert Roberge" userId="7d3ba1ecd22967b8" providerId="LiveId" clId="{59F936DB-1A8D-4E41-96E3-B57B24128CB9}" dt="2019-02-12T15:02:15.271" v="24" actId="20577"/>
-          <ac:spMkLst>
-            <pc:docMk/>
-            <pc:sldMk cId="3191215242" sldId="297"/>
-            <ac:spMk id="3" creationId="{00000000-0000-0000-0000-000000000000}"/>
-          </ac:spMkLst>
-        </pc:spChg>
-      </pc:sldChg>
-    </pc:docChg>
-  </pc:docChgLst>
-</pc:chgInfo>
-</file>
-
 <file path=ppt/notesMasters/notesMaster1.xml><?xml version="1.0" encoding="utf-8"?>
 <p:notesMaster xmlns:a="http://schemas.openxmlformats.org/drawingml/2006/main" xmlns:r="http://schemas.openxmlformats.org/officeDocument/2006/relationships" xmlns:p="http://schemas.openxmlformats.org/presentationml/2006/main">
   <p:cSld>
@@ -430,7 +274,7 @@
           <a:p>
             <a:fld id="{C48A5AB8-C75E-4242-AC76-9DAE875A82E7}" type="datetimeFigureOut">
               <a:rPr lang="en-US" smtClean="0"/>
-              <a:t>2/14/2019</a:t>
+              <a:t>2/22/2019</a:t>
             </a:fld>
             <a:endParaRPr lang="en-US"/>
           </a:p>
@@ -1064,6 +908,90 @@
     <p:extLst>
       <p:ext uri="{BB962C8B-B14F-4D97-AF65-F5344CB8AC3E}">
         <p14:creationId xmlns:p14="http://schemas.microsoft.com/office/powerpoint/2010/main" val="3512228826"/>
+      </p:ext>
+    </p:extLst>
+  </p:cSld>
+  <p:clrMapOvr>
+    <a:masterClrMapping/>
+  </p:clrMapOvr>
+</p:notes>
+</file>
+
+<file path=ppt/notesSlides/notesSlide5.xml><?xml version="1.0" encoding="utf-8"?>
+<p:notes xmlns:a="http://schemas.openxmlformats.org/drawingml/2006/main" xmlns:r="http://schemas.openxmlformats.org/officeDocument/2006/relationships" xmlns:p="http://schemas.openxmlformats.org/presentationml/2006/main">
+  <p:cSld>
+    <p:spTree>
+      <p:nvGrpSpPr>
+        <p:cNvPr id="1" name=""/>
+        <p:cNvGrpSpPr/>
+        <p:nvPr/>
+      </p:nvGrpSpPr>
+      <p:grpSpPr>
+        <a:xfrm>
+          <a:off x="0" y="0"/>
+          <a:ext cx="0" cy="0"/>
+          <a:chOff x="0" y="0"/>
+          <a:chExt cx="0" cy="0"/>
+        </a:xfrm>
+      </p:grpSpPr>
+      <p:sp>
+        <p:nvSpPr>
+          <p:cNvPr id="2" name="Slide Image Placeholder 1"/>
+          <p:cNvSpPr>
+            <a:spLocks noGrp="1" noRot="1" noChangeAspect="1"/>
+          </p:cNvSpPr>
+          <p:nvPr>
+            <p:ph type="sldImg"/>
+          </p:nvPr>
+        </p:nvSpPr>
+        <p:spPr/>
+      </p:sp>
+      <p:sp>
+        <p:nvSpPr>
+          <p:cNvPr id="3" name="Notes Placeholder 2"/>
+          <p:cNvSpPr>
+            <a:spLocks noGrp="1"/>
+          </p:cNvSpPr>
+          <p:nvPr>
+            <p:ph type="body" idx="1"/>
+          </p:nvPr>
+        </p:nvSpPr>
+        <p:spPr/>
+        <p:txBody>
+          <a:bodyPr/>
+          <a:lstStyle/>
+          <a:p>
+            <a:endParaRPr lang="en-US" dirty="0"/>
+          </a:p>
+        </p:txBody>
+      </p:sp>
+      <p:sp>
+        <p:nvSpPr>
+          <p:cNvPr id="4" name="Slide Number Placeholder 3"/>
+          <p:cNvSpPr>
+            <a:spLocks noGrp="1"/>
+          </p:cNvSpPr>
+          <p:nvPr>
+            <p:ph type="sldNum" sz="quarter" idx="5"/>
+          </p:nvPr>
+        </p:nvSpPr>
+        <p:spPr/>
+        <p:txBody>
+          <a:bodyPr/>
+          <a:lstStyle/>
+          <a:p>
+            <a:fld id="{D26DA38A-5B6D-4B73-8631-E3ACB22184B3}" type="slidenum">
+              <a:rPr lang="en-US" smtClean="0"/>
+              <a:t>29</a:t>
+            </a:fld>
+            <a:endParaRPr lang="en-US"/>
+          </a:p>
+        </p:txBody>
+      </p:sp>
+    </p:spTree>
+    <p:extLst>
+      <p:ext uri="{BB962C8B-B14F-4D97-AF65-F5344CB8AC3E}">
+        <p14:creationId xmlns:p14="http://schemas.microsoft.com/office/powerpoint/2010/main" val="3457608954"/>
       </p:ext>
     </p:extLst>
   </p:cSld>
@@ -8252,7 +8180,13 @@
       </p:grpSpPr>
       <p:sp>
         <p:nvSpPr>
-          <p:cNvPr id="2" name="Title 1"/>
+          <p:cNvPr id="2" name="Title 1">
+            <a:extLst>
+              <a:ext uri="{FF2B5EF4-FFF2-40B4-BE49-F238E27FC236}">
+                <a16:creationId xmlns:a16="http://schemas.microsoft.com/office/drawing/2014/main" id="{DDAF5278-E631-41A0-A3F1-C9CC25390F88}"/>
+              </a:ext>
+            </a:extLst>
+          </p:cNvPr>
           <p:cNvSpPr>
             <a:spLocks noGrp="1"/>
           </p:cNvSpPr>
@@ -8267,14 +8201,20 @@
           <a:p>
             <a:r>
               <a:rPr lang="en-US" dirty="0"/>
-              <a:t>Community Participation</a:t>
-            </a:r>
-          </a:p>
-        </p:txBody>
-      </p:sp>
-      <p:sp>
-        <p:nvSpPr>
-          <p:cNvPr id="3" name="Content Placeholder 2"/>
+              <a:t>CVE Working Groups</a:t>
+            </a:r>
+          </a:p>
+        </p:txBody>
+      </p:sp>
+      <p:sp>
+        <p:nvSpPr>
+          <p:cNvPr id="3" name="Content Placeholder 2">
+            <a:extLst>
+              <a:ext uri="{FF2B5EF4-FFF2-40B4-BE49-F238E27FC236}">
+                <a16:creationId xmlns:a16="http://schemas.microsoft.com/office/drawing/2014/main" id="{29285F77-9E59-4FAB-8861-4E17DADEC1A1}"/>
+              </a:ext>
+            </a:extLst>
+          </p:cNvPr>
           <p:cNvSpPr>
             <a:spLocks noGrp="1"/>
           </p:cNvSpPr>
@@ -8284,58 +8224,185 @@
         </p:nvSpPr>
         <p:spPr/>
         <p:txBody>
+          <a:bodyPr>
+            <a:normAutofit fontScale="92500" lnSpcReduction="20000"/>
+          </a:bodyPr>
+          <a:lstStyle/>
+          <a:p>
+            <a:r>
+              <a:rPr lang="en-US" dirty="0"/>
+              <a:t>Automation WG</a:t>
+            </a:r>
+          </a:p>
+          <a:p>
+            <a:pPr lvl="1"/>
+            <a:r>
+              <a:rPr lang="en-US" dirty="0"/>
+              <a:t>https://github.com/CVEProject/automation-working-group</a:t>
+            </a:r>
+          </a:p>
+          <a:p>
+            <a:pPr lvl="1"/>
+            <a:r>
+              <a:rPr lang="en-US" dirty="0"/>
+              <a:t>JSON format</a:t>
+            </a:r>
+          </a:p>
+          <a:p>
+            <a:pPr lvl="2"/>
+            <a:r>
+              <a:rPr lang="en-US" sz="1400" dirty="0">
+                <a:hlinkClick r:id="rId3"/>
+              </a:rPr>
+              <a:t>https://github.com/CVEProject/JSON-format-project-AWG</a:t>
+            </a:r>
+            <a:endParaRPr lang="en-US" sz="1400" dirty="0"/>
+          </a:p>
+          <a:p>
+            <a:pPr lvl="2"/>
+            <a:r>
+              <a:rPr lang="en-US" sz="1400" dirty="0"/>
+              <a:t>https://github.com/CVEProject/automation-working-group</a:t>
+            </a:r>
+          </a:p>
+          <a:p>
+            <a:pPr lvl="1"/>
+            <a:r>
+              <a:rPr lang="en-US" dirty="0"/>
+              <a:t>Entry submission service</a:t>
+            </a:r>
+          </a:p>
+          <a:p>
+            <a:pPr lvl="2"/>
+            <a:r>
+              <a:rPr lang="en-US" sz="1400" dirty="0"/>
+              <a:t>https://github.com/CVEProject/cvelist</a:t>
+            </a:r>
+          </a:p>
+          <a:p>
+            <a:pPr lvl="1"/>
+            <a:r>
+              <a:rPr lang="en-US" dirty="0"/>
+              <a:t>CVE ID allocation service</a:t>
+            </a:r>
+          </a:p>
+          <a:p>
+            <a:pPr lvl="2"/>
+            <a:r>
+              <a:rPr lang="en-US" sz="1400" dirty="0"/>
+              <a:t>https://github.com/CVEProject/CVE-ID-Allocation-Service</a:t>
+            </a:r>
+          </a:p>
+          <a:p>
+            <a:pPr lvl="1"/>
+            <a:r>
+              <a:rPr lang="en-US" dirty="0"/>
+              <a:t>CVE user registry</a:t>
+            </a:r>
+          </a:p>
+          <a:p>
+            <a:pPr lvl="2"/>
+            <a:r>
+              <a:rPr lang="en-US" sz="1400" dirty="0"/>
+              <a:t>https://github.com/CVEProject/CVE-User-Registry</a:t>
+            </a:r>
+            <a:endParaRPr lang="en-US" dirty="0"/>
+          </a:p>
+          <a:p>
+            <a:r>
+              <a:rPr lang="en-US" dirty="0"/>
+              <a:t>Strategic Planning WG</a:t>
+            </a:r>
+          </a:p>
+          <a:p>
+            <a:r>
+              <a:rPr lang="en-US" dirty="0"/>
+              <a:t>Cloud Services WG</a:t>
+            </a:r>
+          </a:p>
+          <a:p>
+            <a:r>
+              <a:rPr lang="en-US" dirty="0"/>
+              <a:t>CNA Coordination WG</a:t>
+            </a:r>
+          </a:p>
+          <a:p>
+            <a:r>
+              <a:rPr lang="en-US" dirty="0"/>
+              <a:t>CVE Entry Quality WG</a:t>
+            </a:r>
+          </a:p>
+        </p:txBody>
+      </p:sp>
+      <p:sp>
+        <p:nvSpPr>
+          <p:cNvPr id="4" name="Slide Number Placeholder 3">
+            <a:extLst>
+              <a:ext uri="{FF2B5EF4-FFF2-40B4-BE49-F238E27FC236}">
+                <a16:creationId xmlns:a16="http://schemas.microsoft.com/office/drawing/2014/main" id="{A02937A6-1FD8-4C16-84BE-EA5F5E996400}"/>
+              </a:ext>
+            </a:extLst>
+          </p:cNvPr>
+          <p:cNvSpPr>
+            <a:spLocks noGrp="1"/>
+          </p:cNvSpPr>
+          <p:nvPr>
+            <p:ph type="sldNum" sz="quarter" idx="4"/>
+          </p:nvPr>
+        </p:nvSpPr>
+        <p:spPr/>
+        <p:txBody>
           <a:bodyPr/>
           <a:lstStyle/>
           <a:p>
             <a:r>
-              <a:rPr lang="en-US" dirty="0"/>
-              <a:t>Board Working Groups</a:t>
-            </a:r>
-          </a:p>
-          <a:p>
-            <a:pPr lvl="1"/>
-            <a:r>
-              <a:rPr lang="en-US" dirty="0"/>
-              <a:t>Automation WG</a:t>
-            </a:r>
-          </a:p>
-          <a:p>
-            <a:pPr lvl="1"/>
-            <a:r>
-              <a:rPr lang="en-US" dirty="0"/>
-              <a:t>Strategic Planning WG</a:t>
-            </a:r>
-          </a:p>
-          <a:p>
-            <a:r>
-              <a:rPr lang="en-US" dirty="0"/>
-              <a:t>CNA mailing list</a:t>
-            </a:r>
-          </a:p>
-          <a:p>
-            <a:r>
-              <a:rPr lang="en-US" dirty="0"/>
-              <a:t>CNA Summits</a:t>
-            </a:r>
-          </a:p>
-          <a:p>
-            <a:r>
-              <a:rPr lang="en-US" dirty="0"/>
-              <a:t>Webinars</a:t>
-            </a:r>
-          </a:p>
-          <a:p>
-            <a:r>
-              <a:rPr lang="en-US" dirty="0"/>
-              <a:t>Handshake (MITRE’s social media platform)</a:t>
-            </a:r>
+              <a:rPr lang="en-US">
+                <a:solidFill>
+                  <a:srgbClr val="C1CD23"/>
+                </a:solidFill>
+              </a:rPr>
+              <a:t>|</a:t>
+            </a:r>
+            <a:r>
+              <a:rPr lang="en-US"/>
+              <a:t> </a:t>
+            </a:r>
+            <a:fld id="{295008BC-DA31-4D19-837B-EFA4386B05F5}" type="slidenum">
+              <a:rPr lang="en-US" smtClean="0">
+                <a:solidFill>
+                  <a:schemeClr val="tx1">
+                    <a:lumMod val="50000"/>
+                    <a:lumOff val="50000"/>
+                  </a:schemeClr>
+                </a:solidFill>
+              </a:rPr>
+              <a:pPr/>
+              <a:t>29</a:t>
+            </a:fld>
+            <a:r>
+              <a:rPr lang="en-US"/>
+              <a:t> </a:t>
+            </a:r>
+            <a:r>
+              <a:rPr lang="en-US">
+                <a:solidFill>
+                  <a:srgbClr val="C1CD23"/>
+                </a:solidFill>
+              </a:rPr>
+              <a:t>|</a:t>
+            </a:r>
+            <a:endParaRPr lang="en-US" dirty="0">
+              <a:solidFill>
+                <a:srgbClr val="C1CD23"/>
+              </a:solidFill>
+            </a:endParaRPr>
           </a:p>
         </p:txBody>
       </p:sp>
     </p:spTree>
     <p:extLst>
       <p:ext uri="{BB962C8B-B14F-4D97-AF65-F5344CB8AC3E}">
-        <p14:creationId xmlns:p14="http://schemas.microsoft.com/office/powerpoint/2010/main" val="3306588478"/>
+        <p14:creationId xmlns:p14="http://schemas.microsoft.com/office/powerpoint/2010/main" val="1293480870"/>
       </p:ext>
     </p:extLst>
   </p:cSld>
@@ -8416,12 +8483,12 @@
       </p:grpSpPr>
       <p:sp>
         <p:nvSpPr>
-          <p:cNvPr id="4" name="Title 3"/>
-          <p:cNvSpPr>
-            <a:spLocks noGrp="1"/>
-          </p:cNvSpPr>
-          <p:nvPr>
-            <p:ph type="ctrTitle" sz="quarter"/>
+          <p:cNvPr id="2" name="Title 1"/>
+          <p:cNvSpPr>
+            <a:spLocks noGrp="1"/>
+          </p:cNvSpPr>
+          <p:nvPr>
+            <p:ph type="title"/>
           </p:nvPr>
         </p:nvSpPr>
         <p:spPr/>
@@ -8431,7 +8498,82 @@
           <a:p>
             <a:r>
               <a:rPr lang="en-US" dirty="0"/>
-              <a:t>Questions</a:t>
+              <a:t>Other Community Participation</a:t>
+            </a:r>
+          </a:p>
+        </p:txBody>
+      </p:sp>
+      <p:sp>
+        <p:nvSpPr>
+          <p:cNvPr id="3" name="Content Placeholder 2"/>
+          <p:cNvSpPr>
+            <a:spLocks noGrp="1"/>
+          </p:cNvSpPr>
+          <p:nvPr>
+            <p:ph idx="1"/>
+          </p:nvPr>
+        </p:nvSpPr>
+        <p:spPr/>
+        <p:txBody>
+          <a:bodyPr/>
+          <a:lstStyle/>
+          <a:p>
+            <a:r>
+              <a:rPr lang="en-US" dirty="0"/>
+              <a:t>CNA mailing list</a:t>
+            </a:r>
+          </a:p>
+          <a:p>
+            <a:pPr lvl="1"/>
+            <a:r>
+              <a:rPr lang="en-US" dirty="0"/>
+              <a:t>For program wide announcements</a:t>
+            </a:r>
+          </a:p>
+          <a:p>
+            <a:pPr lvl="1"/>
+            <a:r>
+              <a:rPr lang="en-US" dirty="0"/>
+              <a:t>Used by CNAs to discuss issues that may affect multiple CNAs</a:t>
+            </a:r>
+          </a:p>
+          <a:p>
+            <a:pPr lvl="1"/>
+            <a:r>
+              <a:rPr lang="en-US" dirty="0"/>
+              <a:t>Limited to CNA and Board members</a:t>
+            </a:r>
+          </a:p>
+          <a:p>
+            <a:r>
+              <a:rPr lang="en-US" dirty="0"/>
+              <a:t>CNA Summits</a:t>
+            </a:r>
+          </a:p>
+          <a:p>
+            <a:pPr lvl="1"/>
+            <a:r>
+              <a:rPr lang="en-US" dirty="0"/>
+              <a:t>Yearly conference to discuss lessons learned, issues, and program improvements</a:t>
+            </a:r>
+          </a:p>
+          <a:p>
+            <a:r>
+              <a:rPr lang="en-US" dirty="0"/>
+              <a:t>Webinars</a:t>
+            </a:r>
+          </a:p>
+          <a:p>
+            <a:pPr lvl="1"/>
+            <a:r>
+              <a:rPr lang="en-US" dirty="0"/>
+              <a:t>Ad-Hoc meetings to discuss issues affecting CNA and the CVE project</a:t>
+            </a:r>
+          </a:p>
+          <a:p>
+            <a:r>
+              <a:rPr lang="en-US" dirty="0"/>
+              <a:t>Handshake (MITRE’s social media platform)</a:t>
             </a:r>
           </a:p>
         </p:txBody>
@@ -8439,7 +8581,7 @@
     </p:spTree>
     <p:extLst>
       <p:ext uri="{BB962C8B-B14F-4D97-AF65-F5344CB8AC3E}">
-        <p14:creationId xmlns:p14="http://schemas.microsoft.com/office/powerpoint/2010/main" val="484623824"/>
+        <p14:creationId xmlns:p14="http://schemas.microsoft.com/office/powerpoint/2010/main" val="3306588478"/>
       </p:ext>
     </p:extLst>
   </p:cSld>
@@ -8468,7 +8610,7 @@
       </p:grpSpPr>
       <p:sp>
         <p:nvSpPr>
-          <p:cNvPr id="3" name="Title 2"/>
+          <p:cNvPr id="4" name="Title 3"/>
           <p:cNvSpPr>
             <a:spLocks noGrp="1"/>
           </p:cNvSpPr>
@@ -8483,7 +8625,7 @@
           <a:p>
             <a:r>
               <a:rPr lang="en-US" dirty="0"/>
-              <a:t>Backup Slides</a:t>
+              <a:t>Questions</a:t>
             </a:r>
           </a:p>
         </p:txBody>
@@ -8491,7 +8633,7 @@
     </p:spTree>
     <p:extLst>
       <p:ext uri="{BB962C8B-B14F-4D97-AF65-F5344CB8AC3E}">
-        <p14:creationId xmlns:p14="http://schemas.microsoft.com/office/powerpoint/2010/main" val="2819593005"/>
+        <p14:creationId xmlns:p14="http://schemas.microsoft.com/office/powerpoint/2010/main" val="484623824"/>
       </p:ext>
     </p:extLst>
   </p:cSld>
@@ -8520,12 +8662,12 @@
       </p:grpSpPr>
       <p:sp>
         <p:nvSpPr>
-          <p:cNvPr id="2" name="Title 1"/>
-          <p:cNvSpPr>
-            <a:spLocks noGrp="1"/>
-          </p:cNvSpPr>
-          <p:nvPr>
-            <p:ph type="title"/>
+          <p:cNvPr id="3" name="Title 2"/>
+          <p:cNvSpPr>
+            <a:spLocks noGrp="1"/>
+          </p:cNvSpPr>
+          <p:nvPr>
+            <p:ph type="ctrTitle" sz="quarter"/>
           </p:nvPr>
         </p:nvSpPr>
         <p:spPr/>
@@ -8535,126 +8677,15 @@
           <a:p>
             <a:r>
               <a:rPr lang="en-US" dirty="0"/>
-              <a:t>Assignment Rules</a:t>
-            </a:r>
-          </a:p>
-        </p:txBody>
-      </p:sp>
-      <p:sp>
-        <p:nvSpPr>
-          <p:cNvPr id="3" name="Content Placeholder 2"/>
-          <p:cNvSpPr>
-            <a:spLocks noGrp="1"/>
-          </p:cNvSpPr>
-          <p:nvPr>
-            <p:ph idx="1"/>
-          </p:nvPr>
-        </p:nvSpPr>
-        <p:spPr/>
-        <p:txBody>
-          <a:bodyPr>
-            <a:normAutofit/>
-          </a:bodyPr>
-          <a:lstStyle/>
-          <a:p>
-            <a:pPr lvl="0">
-              <a:spcAft>
-                <a:spcPts val="1200"/>
-              </a:spcAft>
-            </a:pPr>
-            <a:r>
-              <a:rPr lang="en-US" dirty="0"/>
-              <a:t>The following rules apply to all CNAs when assigning CVE IDs to vulnerabilities:</a:t>
-            </a:r>
-          </a:p>
-          <a:p>
-            <a:pPr lvl="1">
-              <a:spcAft>
-                <a:spcPts val="1200"/>
-              </a:spcAft>
-            </a:pPr>
-            <a:r>
-              <a:rPr lang="en-US" dirty="0"/>
-              <a:t>Assign CVE IDs to security vulnerabilities within scope of authority for vulnerabilities that are, or will be, made public</a:t>
-            </a:r>
-          </a:p>
-          <a:p>
-            <a:pPr lvl="1">
-              <a:spcAft>
-                <a:spcPts val="1200"/>
-              </a:spcAft>
-            </a:pPr>
-            <a:r>
-              <a:rPr lang="en-US" dirty="0"/>
-              <a:t>Only assign CVE IDs to security vulnerabilities when no lower level CNA exists that already covers a more constrained scope (this may require coordination)</a:t>
-            </a:r>
-          </a:p>
-          <a:p>
-            <a:pPr lvl="1">
-              <a:spcAft>
-                <a:spcPts val="1200"/>
-              </a:spcAft>
-            </a:pPr>
-            <a:r>
-              <a:rPr lang="en-US" dirty="0"/>
-              <a:t>Follow CVE counting rules established by the CVE Program as implemented by the Program Root CNA and augmented by Root CNAs and Sub-CNAs if applicable</a:t>
-            </a:r>
-          </a:p>
-          <a:p>
-            <a:pPr lvl="1">
-              <a:spcAft>
-                <a:spcPts val="1200"/>
-              </a:spcAft>
-            </a:pPr>
-            <a:r>
-              <a:rPr lang="en-US" dirty="0"/>
-              <a:t>Disputes related to scope should first be addressed by the next higher-level CNA before being escalated</a:t>
-            </a:r>
-          </a:p>
-          <a:p>
-            <a:endParaRPr lang="en-US" dirty="0"/>
-          </a:p>
-        </p:txBody>
-      </p:sp>
-      <p:sp>
-        <p:nvSpPr>
-          <p:cNvPr id="4" name="Slide Number Placeholder 3"/>
-          <p:cNvSpPr>
-            <a:spLocks noGrp="1"/>
-          </p:cNvSpPr>
-          <p:nvPr>
-            <p:ph type="sldNum" sz="quarter" idx="4"/>
-          </p:nvPr>
-        </p:nvSpPr>
-        <p:spPr/>
-        <p:txBody>
-          <a:bodyPr/>
-          <a:lstStyle/>
-          <a:p>
-            <a:r>
-              <a:rPr lang="en-US" dirty="0">
-                <a:solidFill>
-                  <a:srgbClr val="C1CD23"/>
-                </a:solidFill>
-              </a:rPr>
-              <a:t>|</a:t>
-            </a:r>
-            <a:r>
-              <a:rPr lang="en-US" dirty="0"/>
-              <a:t> </a:t>
-            </a:r>
-            <a:endParaRPr lang="en-US" dirty="0">
-              <a:solidFill>
-                <a:srgbClr val="C1CD23"/>
-              </a:solidFill>
-            </a:endParaRPr>
+              <a:t>Backup Slides</a:t>
+            </a:r>
           </a:p>
         </p:txBody>
       </p:sp>
     </p:spTree>
     <p:extLst>
       <p:ext uri="{BB962C8B-B14F-4D97-AF65-F5344CB8AC3E}">
-        <p14:creationId xmlns:p14="http://schemas.microsoft.com/office/powerpoint/2010/main" val="4198695085"/>
+        <p14:creationId xmlns:p14="http://schemas.microsoft.com/office/powerpoint/2010/main" val="2819593005"/>
       </p:ext>
     </p:extLst>
   </p:cSld>
@@ -8683,13 +8714,7 @@
       </p:grpSpPr>
       <p:sp>
         <p:nvSpPr>
-          <p:cNvPr id="2" name="Title 1">
-            <a:extLst>
-              <a:ext uri="{FF2B5EF4-FFF2-40B4-BE49-F238E27FC236}">
-                <a16:creationId xmlns:a16="http://schemas.microsoft.com/office/drawing/2014/main" id="{9EAA80A2-4F5D-4E38-BA58-1E1864288533}"/>
-              </a:ext>
-            </a:extLst>
-          </p:cNvPr>
+          <p:cNvPr id="2" name="Title 1"/>
           <p:cNvSpPr>
             <a:spLocks noGrp="1"/>
           </p:cNvSpPr>
@@ -8704,20 +8729,14 @@
           <a:p>
             <a:r>
               <a:rPr lang="en-US" dirty="0"/>
-              <a:t>Communication Rules (1 of 2)</a:t>
-            </a:r>
-          </a:p>
-        </p:txBody>
-      </p:sp>
-      <p:sp>
-        <p:nvSpPr>
-          <p:cNvPr id="3" name="Content Placeholder 2">
-            <a:extLst>
-              <a:ext uri="{FF2B5EF4-FFF2-40B4-BE49-F238E27FC236}">
-                <a16:creationId xmlns:a16="http://schemas.microsoft.com/office/drawing/2014/main" id="{4F1610AB-C9A4-4D29-A95F-C1BD8000A9D6}"/>
-              </a:ext>
-            </a:extLst>
-          </p:cNvPr>
+              <a:t>Assignment Rules</a:t>
+            </a:r>
+          </a:p>
+        </p:txBody>
+      </p:sp>
+      <p:sp>
+        <p:nvSpPr>
+          <p:cNvPr id="3" name="Content Placeholder 2"/>
           <p:cNvSpPr>
             <a:spLocks noGrp="1"/>
           </p:cNvSpPr>
@@ -8728,76 +8747,108 @@
         <p:spPr/>
         <p:txBody>
           <a:bodyPr>
-            <a:normAutofit fontScale="92500" lnSpcReduction="10000"/>
+            <a:normAutofit/>
           </a:bodyPr>
           <a:lstStyle/>
           <a:p>
-            <a:r>
-              <a:rPr lang="en-US" dirty="0"/>
-              <a:t>The following communications rules apply to all CNAs:</a:t>
-            </a:r>
-          </a:p>
-          <a:p>
-            <a:pPr lvl="1"/>
-            <a:r>
-              <a:rPr lang="en-US" dirty="0"/>
-              <a:t>Provide points of contact (POCs) (e.g., email addresses, URLs, etc.) to all levels above their own</a:t>
-            </a:r>
-          </a:p>
-          <a:p>
-            <a:pPr lvl="1"/>
-            <a:r>
-              <a:rPr lang="en-US" dirty="0"/>
-              <a:t>Publish a disclosure (embargo) policy and a description of its scope </a:t>
-            </a:r>
-          </a:p>
-          <a:p>
-            <a:pPr lvl="1"/>
-            <a:r>
-              <a:rPr lang="en-US" dirty="0"/>
-              <a:t>If a CNA accepts requests from parties outside the CNA, provide a means (e.g., hyperlink, email) for the public to contact them regarding vulnerabilities. CNAs can also provide guidelines for how to communicate with them, such as language restrictions (“English-only”, “Japanese or English”, etc.). Provide the list publicly and to all levels above their own</a:t>
-            </a:r>
-          </a:p>
-          <a:p>
-            <a:pPr lvl="1"/>
-            <a:r>
-              <a:rPr lang="en-US" dirty="0"/>
-              <a:t>Be responsive to inquiries from all CNAs</a:t>
-            </a:r>
-          </a:p>
-          <a:p>
-            <a:pPr lvl="1"/>
-            <a:r>
-              <a:rPr lang="en-US" dirty="0"/>
-              <a:t>When a vulnerability is reported to the CNA and a CVE ID is assigned to that vulnerability, provide the CVE ID to the reporter. This rule does not override any embargo rules established by the CNA</a:t>
-            </a:r>
-          </a:p>
-          <a:p>
-            <a:pPr lvl="1"/>
+            <a:pPr lvl="0">
+              <a:spcAft>
+                <a:spcPts val="1200"/>
+              </a:spcAft>
+            </a:pPr>
+            <a:r>
+              <a:rPr lang="en-US" dirty="0"/>
+              <a:t>The following rules apply to all CNAs when assigning CVE IDs to vulnerabilities:</a:t>
+            </a:r>
+          </a:p>
+          <a:p>
+            <a:pPr lvl="1">
+              <a:spcAft>
+                <a:spcPts val="1200"/>
+              </a:spcAft>
+            </a:pPr>
+            <a:r>
+              <a:rPr lang="en-US" dirty="0"/>
+              <a:t>Assign CVE IDs to security vulnerabilities within scope of authority for vulnerabilities that are, or will be, made public</a:t>
+            </a:r>
+          </a:p>
+          <a:p>
+            <a:pPr lvl="1">
+              <a:spcAft>
+                <a:spcPts val="1200"/>
+              </a:spcAft>
+            </a:pPr>
+            <a:r>
+              <a:rPr lang="en-US" dirty="0"/>
+              <a:t>Only assign CVE IDs to security vulnerabilities when no lower level CNA exists that already covers a more constrained scope (this may require coordination)</a:t>
+            </a:r>
+          </a:p>
+          <a:p>
+            <a:pPr lvl="1">
+              <a:spcAft>
+                <a:spcPts val="1200"/>
+              </a:spcAft>
+            </a:pPr>
+            <a:r>
+              <a:rPr lang="en-US" dirty="0"/>
+              <a:t>Follow CVE counting rules established by the CVE Program as implemented by the Program Root CNA and augmented by Root CNAs and Sub-CNAs if applicable</a:t>
+            </a:r>
+          </a:p>
+          <a:p>
+            <a:pPr lvl="1">
+              <a:spcAft>
+                <a:spcPts val="1200"/>
+              </a:spcAft>
+            </a:pPr>
+            <a:r>
+              <a:rPr lang="en-US" dirty="0"/>
+              <a:t>Disputes related to scope should first be addressed by the next higher-level CNA before being escalated</a:t>
+            </a:r>
+          </a:p>
+          <a:p>
             <a:endParaRPr lang="en-US" dirty="0"/>
           </a:p>
-          <a:p>
-            <a:pPr lvl="1"/>
-            <a:endParaRPr lang="en-US" dirty="0"/>
-          </a:p>
-          <a:p>
-            <a:pPr lvl="1"/>
-            <a:endParaRPr lang="en-US" dirty="0"/>
-          </a:p>
-          <a:p>
-            <a:pPr lvl="1"/>
-            <a:endParaRPr lang="en-US" dirty="0"/>
-          </a:p>
-          <a:p>
-            <a:pPr lvl="1"/>
-            <a:endParaRPr lang="en-US" dirty="0"/>
+        </p:txBody>
+      </p:sp>
+      <p:sp>
+        <p:nvSpPr>
+          <p:cNvPr id="4" name="Slide Number Placeholder 3"/>
+          <p:cNvSpPr>
+            <a:spLocks noGrp="1"/>
+          </p:cNvSpPr>
+          <p:nvPr>
+            <p:ph type="sldNum" sz="quarter" idx="4"/>
+          </p:nvPr>
+        </p:nvSpPr>
+        <p:spPr/>
+        <p:txBody>
+          <a:bodyPr/>
+          <a:lstStyle/>
+          <a:p>
+            <a:r>
+              <a:rPr lang="en-US" dirty="0">
+                <a:solidFill>
+                  <a:srgbClr val="C1CD23"/>
+                </a:solidFill>
+              </a:rPr>
+              <a:t>|</a:t>
+            </a:r>
+            <a:r>
+              <a:rPr lang="en-US" dirty="0"/>
+              <a:t> </a:t>
+            </a:r>
+            <a:endParaRPr lang="en-US" dirty="0">
+              <a:solidFill>
+                <a:srgbClr val="C1CD23"/>
+              </a:solidFill>
+            </a:endParaRPr>
           </a:p>
         </p:txBody>
       </p:sp>
     </p:spTree>
     <p:extLst>
       <p:ext uri="{BB962C8B-B14F-4D97-AF65-F5344CB8AC3E}">
-        <p14:creationId xmlns:p14="http://schemas.microsoft.com/office/powerpoint/2010/main" val="1940010566"/>
+        <p14:creationId xmlns:p14="http://schemas.microsoft.com/office/powerpoint/2010/main" val="4198695085"/>
       </p:ext>
     </p:extLst>
   </p:cSld>
@@ -8826,7 +8877,13 @@
       </p:grpSpPr>
       <p:sp>
         <p:nvSpPr>
-          <p:cNvPr id="2" name="Title 1"/>
+          <p:cNvPr id="2" name="Title 1">
+            <a:extLst>
+              <a:ext uri="{FF2B5EF4-FFF2-40B4-BE49-F238E27FC236}">
+                <a16:creationId xmlns:a16="http://schemas.microsoft.com/office/drawing/2014/main" id="{9EAA80A2-4F5D-4E38-BA58-1E1864288533}"/>
+              </a:ext>
+            </a:extLst>
+          </p:cNvPr>
           <p:cNvSpPr>
             <a:spLocks noGrp="1"/>
           </p:cNvSpPr>
@@ -8841,14 +8898,20 @@
           <a:p>
             <a:r>
               <a:rPr lang="en-US" dirty="0"/>
-              <a:t>Communication Rules (2 of 2)</a:t>
-            </a:r>
-          </a:p>
-        </p:txBody>
-      </p:sp>
-      <p:sp>
-        <p:nvSpPr>
-          <p:cNvPr id="3" name="Content Placeholder 2"/>
+              <a:t>Communication Rules (1 of 2)</a:t>
+            </a:r>
+          </a:p>
+        </p:txBody>
+      </p:sp>
+      <p:sp>
+        <p:nvSpPr>
+          <p:cNvPr id="3" name="Content Placeholder 2">
+            <a:extLst>
+              <a:ext uri="{FF2B5EF4-FFF2-40B4-BE49-F238E27FC236}">
+                <a16:creationId xmlns:a16="http://schemas.microsoft.com/office/drawing/2014/main" id="{4F1610AB-C9A4-4D29-A95F-C1BD8000A9D6}"/>
+              </a:ext>
+            </a:extLst>
+          </p:cNvPr>
           <p:cNvSpPr>
             <a:spLocks noGrp="1"/>
           </p:cNvSpPr>
@@ -8856,129 +8919,79 @@
             <p:ph idx="1"/>
           </p:nvPr>
         </p:nvSpPr>
-        <p:spPr>
-          <a:xfrm>
-            <a:off x="609600" y="1447800"/>
-            <a:ext cx="8229600" cy="4933122"/>
-          </a:xfrm>
-        </p:spPr>
+        <p:spPr/>
         <p:txBody>
           <a:bodyPr>
-            <a:normAutofit fontScale="85000" lnSpcReduction="20000"/>
+            <a:normAutofit fontScale="92500" lnSpcReduction="10000"/>
           </a:bodyPr>
           <a:lstStyle/>
           <a:p>
-            <a:pPr>
-              <a:spcAft>
-                <a:spcPts val="1200"/>
-              </a:spcAft>
-            </a:pPr>
-            <a:r>
-              <a:rPr lang="en-US" dirty="0"/>
-              <a:t>The following communication rules apply to all CNAs (cont’d):</a:t>
-            </a:r>
-          </a:p>
-          <a:p>
-            <a:pPr lvl="1">
-              <a:spcAft>
-                <a:spcPts val="1200"/>
-              </a:spcAft>
-            </a:pPr>
-            <a:r>
-              <a:rPr lang="en-US" dirty="0"/>
-              <a:t>Notify the next higher level CNA when CVE IDs are assigned and the associated vulnerability is made public (the publication of the vulnerability can be made in any language, but the CVE ID entry must include English only; references to information related to the CVE ID in non-English languages would be included in the reference list for the CVE ID entry)</a:t>
-            </a:r>
-          </a:p>
-          <a:p>
-            <a:pPr lvl="1">
-              <a:spcAft>
-                <a:spcPts val="1200"/>
-              </a:spcAft>
-            </a:pPr>
-            <a:r>
-              <a:rPr lang="en-US" dirty="0"/>
-              <a:t>Provide CVE information to the next higher-level CNA when a CVE ID is assigned and the associated vulnerability made public </a:t>
-            </a:r>
-          </a:p>
-          <a:p>
-            <a:pPr lvl="2">
-              <a:spcAft>
-                <a:spcPts val="1200"/>
-              </a:spcAft>
-            </a:pPr>
-            <a:r>
-              <a:rPr lang="en-US" dirty="0"/>
-              <a:t>For new CVE IDs, this information includes, at a minimum, the CVE ID used, product, affected or fixed version, the problem type, references, and a description on a per-ID basis</a:t>
-            </a:r>
-          </a:p>
-          <a:p>
-            <a:pPr lvl="2">
-              <a:spcAft>
-                <a:spcPts val="1200"/>
-              </a:spcAft>
-            </a:pPr>
-            <a:r>
-              <a:rPr lang="en-US" dirty="0"/>
-              <a:t>When a CVE ID is updated, the CVE ID and data change must be included</a:t>
-            </a:r>
-          </a:p>
-          <a:p>
-            <a:pPr lvl="1">
-              <a:spcAft>
-                <a:spcPts val="1200"/>
-              </a:spcAft>
-            </a:pPr>
-            <a:r>
-              <a:rPr lang="en-US" dirty="0"/>
-              <a:t>Have an established distribution point for in-scope vulnerability disclosures that is freely available to the general public without restrictions (e.g., open websites, websites with registration and free accounts without restrictions, etc.)</a:t>
-            </a:r>
-          </a:p>
-          <a:p>
-            <a:pPr lvl="1">
-              <a:spcAft>
-                <a:spcPts val="1200"/>
-              </a:spcAft>
-            </a:pPr>
-            <a:r>
-              <a:rPr lang="en-US" dirty="0"/>
-              <a:t>Publish required CVE information in a standard format and presentation</a:t>
-            </a:r>
-          </a:p>
-          <a:p>
+            <a:r>
+              <a:rPr lang="en-US" dirty="0"/>
+              <a:t>The following communications rules apply to all CNAs:</a:t>
+            </a:r>
+          </a:p>
+          <a:p>
+            <a:pPr lvl="1"/>
+            <a:r>
+              <a:rPr lang="en-US" dirty="0"/>
+              <a:t>Provide points of contact (POCs) (e.g., email addresses, URLs, etc.) to all levels above their own</a:t>
+            </a:r>
+          </a:p>
+          <a:p>
+            <a:pPr lvl="1"/>
+            <a:r>
+              <a:rPr lang="en-US" dirty="0"/>
+              <a:t>Publish a disclosure (embargo) policy and a description of its scope </a:t>
+            </a:r>
+          </a:p>
+          <a:p>
+            <a:pPr lvl="1"/>
+            <a:r>
+              <a:rPr lang="en-US" dirty="0"/>
+              <a:t>If a CNA accepts requests from parties outside the CNA, provide a means (e.g., hyperlink, email) for the public to contact them regarding vulnerabilities. CNAs can also provide guidelines for how to communicate with them, such as language restrictions (“English-only”, “Japanese or English”, etc.). Provide the list publicly and to all levels above their own</a:t>
+            </a:r>
+          </a:p>
+          <a:p>
+            <a:pPr lvl="1"/>
+            <a:r>
+              <a:rPr lang="en-US" dirty="0"/>
+              <a:t>Be responsive to inquiries from all CNAs</a:t>
+            </a:r>
+          </a:p>
+          <a:p>
+            <a:pPr lvl="1"/>
+            <a:r>
+              <a:rPr lang="en-US" dirty="0"/>
+              <a:t>When a vulnerability is reported to the CNA and a CVE ID is assigned to that vulnerability, provide the CVE ID to the reporter. This rule does not override any embargo rules established by the CNA</a:t>
+            </a:r>
+          </a:p>
+          <a:p>
+            <a:pPr lvl="1"/>
             <a:endParaRPr lang="en-US" dirty="0"/>
           </a:p>
-        </p:txBody>
-      </p:sp>
-      <p:sp>
-        <p:nvSpPr>
-          <p:cNvPr id="4" name="Slide Number Placeholder 3"/>
-          <p:cNvSpPr>
-            <a:spLocks noGrp="1"/>
-          </p:cNvSpPr>
-          <p:nvPr>
-            <p:ph type="sldNum" sz="quarter" idx="4"/>
-          </p:nvPr>
-        </p:nvSpPr>
-        <p:spPr/>
-        <p:txBody>
-          <a:bodyPr/>
-          <a:lstStyle/>
-          <a:p>
-            <a:r>
-              <a:rPr lang="en-US" dirty="0">
-                <a:solidFill>
-                  <a:srgbClr val="C1CD23"/>
-                </a:solidFill>
-              </a:rPr>
-              <a:t>|</a:t>
-            </a:r>
+          <a:p>
+            <a:pPr lvl="1"/>
+            <a:endParaRPr lang="en-US" dirty="0"/>
+          </a:p>
+          <a:p>
+            <a:pPr lvl="1"/>
+            <a:endParaRPr lang="en-US" dirty="0"/>
+          </a:p>
+          <a:p>
+            <a:pPr lvl="1"/>
+            <a:endParaRPr lang="en-US" dirty="0"/>
+          </a:p>
+          <a:p>
+            <a:pPr lvl="1"/>
+            <a:endParaRPr lang="en-US" dirty="0"/>
           </a:p>
         </p:txBody>
       </p:sp>
     </p:spTree>
     <p:extLst>
       <p:ext uri="{BB962C8B-B14F-4D97-AF65-F5344CB8AC3E}">
-        <p14:creationId xmlns:p14="http://schemas.microsoft.com/office/powerpoint/2010/main" val="2840418134"/>
+        <p14:creationId xmlns:p14="http://schemas.microsoft.com/office/powerpoint/2010/main" val="1940010566"/>
       </p:ext>
     </p:extLst>
   </p:cSld>
@@ -9022,7 +9035,7 @@
           <a:p>
             <a:r>
               <a:rPr lang="en-US" dirty="0"/>
-              <a:t>Administration Rules</a:t>
+              <a:t>Communication Rules (2 of 2)</a:t>
             </a:r>
           </a:p>
         </p:txBody>
@@ -9037,65 +9050,92 @@
             <p:ph idx="1"/>
           </p:nvPr>
         </p:nvSpPr>
-        <p:spPr/>
+        <p:spPr>
+          <a:xfrm>
+            <a:off x="609600" y="1447800"/>
+            <a:ext cx="8229600" cy="4933122"/>
+          </a:xfrm>
+        </p:spPr>
         <p:txBody>
           <a:bodyPr>
-            <a:normAutofit/>
+            <a:normAutofit fontScale="85000" lnSpcReduction="20000"/>
           </a:bodyPr>
           <a:lstStyle/>
           <a:p>
-            <a:r>
-              <a:rPr lang="en-US" dirty="0"/>
-              <a:t>The following rules apply to all CNAs for the administration of the CVE Program:</a:t>
-            </a:r>
-          </a:p>
-          <a:p>
-            <a:pPr lvl="1"/>
-            <a:r>
-              <a:rPr lang="en-US" dirty="0"/>
-              <a:t>Operate under the CVE </a:t>
-            </a:r>
-            <a:r>
-              <a:rPr lang="en-US" dirty="0">
-                <a:hlinkClick r:id="rId2"/>
-              </a:rPr>
-              <a:t>Terms of Use</a:t>
-            </a:r>
-            <a:endParaRPr lang="en-US" dirty="0"/>
-          </a:p>
-          <a:p>
-            <a:pPr lvl="1"/>
-            <a:r>
-              <a:rPr lang="en-US" dirty="0"/>
-              <a:t>Track and provide metrics related to responsiveness to higher-level CNAs</a:t>
-            </a:r>
-          </a:p>
-          <a:p>
-            <a:pPr lvl="2"/>
-            <a:r>
-              <a:rPr lang="en-US" dirty="0"/>
-              <a:t>Responsiveness metrics are established to ensure that CNAs are responsive to different types of requests from their various communities, and in timeframes appropriate for those communities</a:t>
-            </a:r>
-          </a:p>
-          <a:p>
-            <a:pPr lvl="2"/>
-            <a:r>
-              <a:rPr lang="en-US" dirty="0"/>
-              <a:t>Metrics are provided quarterly to the next higher-level CNA </a:t>
-            </a:r>
-          </a:p>
-          <a:p>
-            <a:pPr lvl="2"/>
-            <a:r>
-              <a:rPr lang="en-US" dirty="0"/>
-              <a:t>Responsiveness metrics may vary by CNA as determined by the unique circumstances of the particular CNA community </a:t>
-            </a:r>
-          </a:p>
-          <a:p>
-            <a:pPr lvl="1"/>
-            <a:r>
-              <a:rPr lang="en-US" dirty="0"/>
-              <a:t>Provide any documentation required to adjudicate disputes to the higher-level CNA</a:t>
+            <a:pPr>
+              <a:spcAft>
+                <a:spcPts val="1200"/>
+              </a:spcAft>
+            </a:pPr>
+            <a:r>
+              <a:rPr lang="en-US" dirty="0"/>
+              <a:t>The following communication rules apply to all CNAs (cont’d):</a:t>
+            </a:r>
+          </a:p>
+          <a:p>
+            <a:pPr lvl="1">
+              <a:spcAft>
+                <a:spcPts val="1200"/>
+              </a:spcAft>
+            </a:pPr>
+            <a:r>
+              <a:rPr lang="en-US" dirty="0"/>
+              <a:t>Notify the next higher level CNA when CVE IDs are assigned and the associated vulnerability is made public (the publication of the vulnerability can be made in any language, but the CVE ID entry must include English only; references to information related to the CVE ID in non-English languages would be included in the reference list for the CVE ID entry)</a:t>
+            </a:r>
+          </a:p>
+          <a:p>
+            <a:pPr lvl="1">
+              <a:spcAft>
+                <a:spcPts val="1200"/>
+              </a:spcAft>
+            </a:pPr>
+            <a:r>
+              <a:rPr lang="en-US" dirty="0"/>
+              <a:t>Provide CVE information to the next higher-level CNA when a CVE ID is assigned and the associated vulnerability made public </a:t>
+            </a:r>
+          </a:p>
+          <a:p>
+            <a:pPr lvl="2">
+              <a:spcAft>
+                <a:spcPts val="1200"/>
+              </a:spcAft>
+            </a:pPr>
+            <a:r>
+              <a:rPr lang="en-US" dirty="0"/>
+              <a:t>For new CVE IDs, this information includes, at a minimum, the CVE ID used, product, affected or fixed version, the problem type, references, and a description on a per-ID basis</a:t>
+            </a:r>
+          </a:p>
+          <a:p>
+            <a:pPr lvl="2">
+              <a:spcAft>
+                <a:spcPts val="1200"/>
+              </a:spcAft>
+            </a:pPr>
+            <a:r>
+              <a:rPr lang="en-US" dirty="0"/>
+              <a:t>When a CVE ID is updated, the CVE ID and data change must be included</a:t>
+            </a:r>
+          </a:p>
+          <a:p>
+            <a:pPr lvl="1">
+              <a:spcAft>
+                <a:spcPts val="1200"/>
+              </a:spcAft>
+            </a:pPr>
+            <a:r>
+              <a:rPr lang="en-US" dirty="0"/>
+              <a:t>Have an established distribution point for in-scope vulnerability disclosures that is freely available to the general public without restrictions (e.g., open websites, websites with registration and free accounts without restrictions, etc.)</a:t>
+            </a:r>
+          </a:p>
+          <a:p>
+            <a:pPr lvl="1">
+              <a:spcAft>
+                <a:spcPts val="1200"/>
+              </a:spcAft>
+            </a:pPr>
+            <a:r>
+              <a:rPr lang="en-US" dirty="0"/>
+              <a:t>Publish required CVE information in a standard format and presentation</a:t>
             </a:r>
           </a:p>
           <a:p>
@@ -9132,7 +9172,7 @@
     </p:spTree>
     <p:extLst>
       <p:ext uri="{BB962C8B-B14F-4D97-AF65-F5344CB8AC3E}">
-        <p14:creationId xmlns:p14="http://schemas.microsoft.com/office/powerpoint/2010/main" val="3620328486"/>
+        <p14:creationId xmlns:p14="http://schemas.microsoft.com/office/powerpoint/2010/main" val="2840418134"/>
       </p:ext>
     </p:extLst>
   </p:cSld>
@@ -9161,13 +9201,7 @@
       </p:grpSpPr>
       <p:sp>
         <p:nvSpPr>
-          <p:cNvPr id="2" name="Title 1">
-            <a:extLst>
-              <a:ext uri="{FF2B5EF4-FFF2-40B4-BE49-F238E27FC236}">
-                <a16:creationId xmlns:a16="http://schemas.microsoft.com/office/drawing/2014/main" id="{34749829-5B39-4D22-9468-25D0F93629BD}"/>
-              </a:ext>
-            </a:extLst>
-          </p:cNvPr>
+          <p:cNvPr id="2" name="Title 1"/>
           <p:cNvSpPr>
             <a:spLocks noGrp="1"/>
           </p:cNvSpPr>
@@ -9182,20 +9216,14 @@
           <a:p>
             <a:r>
               <a:rPr lang="en-US" dirty="0"/>
-              <a:t>Additional Root CNA Rules (1 of 2)</a:t>
-            </a:r>
-          </a:p>
-        </p:txBody>
-      </p:sp>
-      <p:sp>
-        <p:nvSpPr>
-          <p:cNvPr id="3" name="Content Placeholder 2">
-            <a:extLst>
-              <a:ext uri="{FF2B5EF4-FFF2-40B4-BE49-F238E27FC236}">
-                <a16:creationId xmlns:a16="http://schemas.microsoft.com/office/drawing/2014/main" id="{0EC2D3C4-8456-4A48-A7F3-7419187E300B}"/>
-              </a:ext>
-            </a:extLst>
-          </p:cNvPr>
+              <a:t>Administration Rules</a:t>
+            </a:r>
+          </a:p>
+        </p:txBody>
+      </p:sp>
+      <p:sp>
+        <p:nvSpPr>
+          <p:cNvPr id="3" name="Content Placeholder 2"/>
           <p:cNvSpPr>
             <a:spLocks noGrp="1"/>
           </p:cNvSpPr>
@@ -9206,98 +9234,99 @@
         <p:spPr/>
         <p:txBody>
           <a:bodyPr>
-            <a:normAutofit fontScale="92500" lnSpcReduction="20000"/>
+            <a:normAutofit/>
           </a:bodyPr>
           <a:lstStyle/>
           <a:p>
             <a:r>
               <a:rPr lang="en-US" dirty="0"/>
-              <a:t>In addition to following the aforementioned rules, Root CNAs must perform the following functions:</a:t>
+              <a:t>The following rules apply to all CNAs for the administration of the CVE Program:</a:t>
             </a:r>
           </a:p>
           <a:p>
             <a:pPr lvl="1"/>
             <a:r>
               <a:rPr lang="en-US" dirty="0"/>
-              <a:t>Assignment Rules</a:t>
+              <a:t>Operate under the CVE </a:t>
+            </a:r>
+            <a:r>
+              <a:rPr lang="en-US" dirty="0">
+                <a:hlinkClick r:id="rId2"/>
+              </a:rPr>
+              <a:t>Terms of Use</a:t>
+            </a:r>
+            <a:endParaRPr lang="en-US" dirty="0"/>
+          </a:p>
+          <a:p>
+            <a:pPr lvl="1"/>
+            <a:r>
+              <a:rPr lang="en-US" dirty="0"/>
+              <a:t>Track and provide metrics related to responsiveness to higher-level CNAs</a:t>
             </a:r>
           </a:p>
           <a:p>
             <a:pPr lvl="2"/>
             <a:r>
               <a:rPr lang="en-US" dirty="0"/>
-              <a:t>Request CVE ID blocks from the Program Root CNA</a:t>
+              <a:t>Responsiveness metrics are established to ensure that CNAs are responsive to different types of requests from their various communities, and in timeframes appropriate for those communities</a:t>
             </a:r>
           </a:p>
           <a:p>
             <a:pPr lvl="2"/>
             <a:r>
               <a:rPr lang="en-US" dirty="0"/>
-              <a:t>Provide CVE ID blocks to Sub-CNAs from their CVE ID block</a:t>
+              <a:t>Metrics are provided quarterly to the next higher-level CNA </a:t>
             </a:r>
           </a:p>
           <a:p>
             <a:pPr lvl="2"/>
             <a:r>
               <a:rPr lang="en-US" dirty="0"/>
-              <a:t>Assign CVE IDs as a CNA when necessary within its scope per the CVE counting rules when none of their Sub-CNAs cover that scope</a:t>
-            </a:r>
-          </a:p>
-          <a:p>
-            <a:pPr lvl="2"/>
-            <a:r>
-              <a:rPr lang="en-US" dirty="0"/>
-              <a:t>Address CVE assignment issues from its Sub-CNAs that require escalation</a:t>
+              <a:t>Responsiveness metrics may vary by CNA as determined by the unique circumstances of the particular CNA community </a:t>
             </a:r>
           </a:p>
           <a:p>
             <a:pPr lvl="1"/>
             <a:r>
               <a:rPr lang="en-US" dirty="0"/>
-              <a:t>Communications Rules</a:t>
-            </a:r>
-          </a:p>
-          <a:p>
-            <a:pPr lvl="2"/>
-            <a:r>
-              <a:rPr lang="en-US" dirty="0"/>
-              <a:t>Notify the Program Root CNA when Sub-CNAs are established or removed</a:t>
-            </a:r>
-          </a:p>
-          <a:p>
-            <a:pPr lvl="2"/>
-            <a:r>
-              <a:rPr lang="en-US" dirty="0"/>
-              <a:t>Provide a public list of POCs and web links for each Sub-CNA in the Root CNA's domain; provide this information to the Program Root CNA</a:t>
-            </a:r>
-          </a:p>
-          <a:p>
-            <a:pPr lvl="2"/>
-            <a:r>
-              <a:rPr lang="en-US" dirty="0"/>
-              <a:t>Maintain a private list of individual POCs within each Sub-CNA for use by CNAs only; provide this information to the Program Root CNA</a:t>
-            </a:r>
-          </a:p>
-          <a:p>
-            <a:pPr lvl="2"/>
-            <a:r>
-              <a:rPr lang="en-US" dirty="0"/>
-              <a:t>Maintain a public listing of the established counting rules followed by the Root CNA and Sub-CNAs in its domain</a:t>
-            </a:r>
-          </a:p>
-          <a:p>
-            <a:pPr lvl="2"/>
+              <a:t>Provide any documentation required to adjudicate disputes to the higher-level CNA</a:t>
+            </a:r>
+          </a:p>
+          <a:p>
             <a:endParaRPr lang="en-US" dirty="0"/>
           </a:p>
-          <a:p>
-            <a:endParaRPr lang="en-US" dirty="0"/>
+        </p:txBody>
+      </p:sp>
+      <p:sp>
+        <p:nvSpPr>
+          <p:cNvPr id="4" name="Slide Number Placeholder 3"/>
+          <p:cNvSpPr>
+            <a:spLocks noGrp="1"/>
+          </p:cNvSpPr>
+          <p:nvPr>
+            <p:ph type="sldNum" sz="quarter" idx="4"/>
+          </p:nvPr>
+        </p:nvSpPr>
+        <p:spPr/>
+        <p:txBody>
+          <a:bodyPr/>
+          <a:lstStyle/>
+          <a:p>
+            <a:r>
+              <a:rPr lang="en-US" dirty="0">
+                <a:solidFill>
+                  <a:srgbClr val="C1CD23"/>
+                </a:solidFill>
+              </a:rPr>
+              <a:t>|</a:t>
+            </a:r>
           </a:p>
         </p:txBody>
       </p:sp>
     </p:spTree>
     <p:extLst>
       <p:ext uri="{BB962C8B-B14F-4D97-AF65-F5344CB8AC3E}">
-        <p14:creationId xmlns:p14="http://schemas.microsoft.com/office/powerpoint/2010/main" val="2780033417"/>
+        <p14:creationId xmlns:p14="http://schemas.microsoft.com/office/powerpoint/2010/main" val="3620328486"/>
       </p:ext>
     </p:extLst>
   </p:cSld>
@@ -9329,7 +9358,7 @@
           <p:cNvPr id="2" name="Title 1">
             <a:extLst>
               <a:ext uri="{FF2B5EF4-FFF2-40B4-BE49-F238E27FC236}">
-                <a16:creationId xmlns:a16="http://schemas.microsoft.com/office/drawing/2014/main" id="{5088A587-B5E5-4EEF-88A3-401608E70112}"/>
+                <a16:creationId xmlns:a16="http://schemas.microsoft.com/office/drawing/2014/main" id="{34749829-5B39-4D22-9468-25D0F93629BD}"/>
               </a:ext>
             </a:extLst>
           </p:cNvPr>
@@ -9347,7 +9376,7 @@
           <a:p>
             <a:r>
               <a:rPr lang="en-US" dirty="0"/>
-              <a:t>Additional Root CNA Rules (2 of 2)</a:t>
+              <a:t>Additional Root CNA Rules (1 of 2)</a:t>
             </a:r>
           </a:p>
         </p:txBody>
@@ -9357,7 +9386,7 @@
           <p:cNvPr id="3" name="Content Placeholder 2">
             <a:extLst>
               <a:ext uri="{FF2B5EF4-FFF2-40B4-BE49-F238E27FC236}">
-                <a16:creationId xmlns:a16="http://schemas.microsoft.com/office/drawing/2014/main" id="{3513BE57-ABD0-4EAA-8A19-3C01E61A8F15}"/>
+                <a16:creationId xmlns:a16="http://schemas.microsoft.com/office/drawing/2014/main" id="{0EC2D3C4-8456-4A48-A7F3-7419187E300B}"/>
               </a:ext>
             </a:extLst>
           </p:cNvPr>
@@ -9371,64 +9400,83 @@
         <p:spPr/>
         <p:txBody>
           <a:bodyPr>
-            <a:normAutofit lnSpcReduction="10000"/>
+            <a:normAutofit fontScale="92500" lnSpcReduction="20000"/>
           </a:bodyPr>
           <a:lstStyle/>
           <a:p>
+            <a:r>
+              <a:rPr lang="en-US" dirty="0"/>
+              <a:t>In addition to following the aforementioned rules, Root CNAs must perform the following functions:</a:t>
+            </a:r>
+          </a:p>
+          <a:p>
             <a:pPr lvl="1"/>
             <a:r>
               <a:rPr lang="en-US" dirty="0"/>
-              <a:t>Administration Rules</a:t>
+              <a:t>Assignment Rules</a:t>
             </a:r>
           </a:p>
           <a:p>
             <a:pPr lvl="2"/>
             <a:r>
               <a:rPr lang="en-US" dirty="0"/>
-              <a:t>Accept metrics reports from Sub-CNAs; the format and instructions for sending metrics are determined by the Root CNA</a:t>
+              <a:t>Request CVE ID blocks from the Program Root CNA</a:t>
             </a:r>
           </a:p>
           <a:p>
             <a:pPr lvl="2"/>
             <a:r>
               <a:rPr lang="en-US" dirty="0"/>
-              <a:t>Submit metrics from Sub-CNAs quarterly, within two weeks of the quarter, to the Program Root CNA; quarters are based on the calendar year</a:t>
+              <a:t>Provide CVE ID blocks to Sub-CNAs from their CVE ID block</a:t>
             </a:r>
           </a:p>
           <a:p>
             <a:pPr lvl="2"/>
             <a:r>
               <a:rPr lang="en-US" dirty="0"/>
-              <a:t>Act as an escalation and adjudication point for issue resolution for Sub-CNAs in its domain </a:t>
+              <a:t>Assign CVE IDs as a CNA when necessary within its scope per the CVE counting rules when none of their Sub-CNAs cover that scope</a:t>
             </a:r>
           </a:p>
           <a:p>
             <a:pPr lvl="2"/>
             <a:r>
               <a:rPr lang="en-US" dirty="0"/>
-              <a:t>When appropriate, apply sanctions upon any Sub-CNAs within its domain and notify the Program Root CNA; the application of sanctions should occur as a last resort</a:t>
+              <a:t>Address CVE assignment issues from its Sub-CNAs that require escalation</a:t>
+            </a:r>
+          </a:p>
+          <a:p>
+            <a:pPr lvl="1"/>
+            <a:r>
+              <a:rPr lang="en-US" dirty="0"/>
+              <a:t>Communications Rules</a:t>
             </a:r>
           </a:p>
           <a:p>
             <a:pPr lvl="2"/>
             <a:r>
               <a:rPr lang="en-US" dirty="0"/>
-              <a:t>Facilitate the enforcement of any administrative actions taken by the Program Root CNA against a Sub-CNA</a:t>
+              <a:t>Notify the Program Root CNA when Sub-CNAs are established or removed</a:t>
             </a:r>
           </a:p>
           <a:p>
             <a:pPr lvl="2"/>
             <a:r>
               <a:rPr lang="en-US" dirty="0"/>
-              <a:t>Follow the CNA Candidate Process described in Section 4 of the </a:t>
-            </a:r>
-            <a:r>
-              <a:rPr lang="en-US" i="1" dirty="0"/>
-              <a:t>CNA Rules</a:t>
-            </a:r>
-            <a:r>
-              <a:rPr lang="en-US" dirty="0"/>
-              <a:t> when adding new Sub-CNAs</a:t>
+              <a:t>Provide a public list of POCs and web links for each Sub-CNA in the Root CNA's domain; provide this information to the Program Root CNA</a:t>
+            </a:r>
+          </a:p>
+          <a:p>
+            <a:pPr lvl="2"/>
+            <a:r>
+              <a:rPr lang="en-US" dirty="0"/>
+              <a:t>Maintain a private list of individual POCs within each Sub-CNA for use by CNAs only; provide this information to the Program Root CNA</a:t>
+            </a:r>
+          </a:p>
+          <a:p>
+            <a:pPr lvl="2"/>
+            <a:r>
+              <a:rPr lang="en-US" dirty="0"/>
+              <a:t>Maintain a public listing of the established counting rules followed by the Root CNA and Sub-CNAs in its domain</a:t>
             </a:r>
           </a:p>
           <a:p>
@@ -9436,7 +9484,6 @@
             <a:endParaRPr lang="en-US" dirty="0"/>
           </a:p>
           <a:p>
-            <a:pPr lvl="2"/>
             <a:endParaRPr lang="en-US" dirty="0"/>
           </a:p>
         </p:txBody>
@@ -9444,7 +9491,7 @@
     </p:spTree>
     <p:extLst>
       <p:ext uri="{BB962C8B-B14F-4D97-AF65-F5344CB8AC3E}">
-        <p14:creationId xmlns:p14="http://schemas.microsoft.com/office/powerpoint/2010/main" val="2446127787"/>
+        <p14:creationId xmlns:p14="http://schemas.microsoft.com/office/powerpoint/2010/main" val="2780033417"/>
       </p:ext>
     </p:extLst>
   </p:cSld>
@@ -9476,7 +9523,7 @@
           <p:cNvPr id="2" name="Title 1">
             <a:extLst>
               <a:ext uri="{FF2B5EF4-FFF2-40B4-BE49-F238E27FC236}">
-                <a16:creationId xmlns:a16="http://schemas.microsoft.com/office/drawing/2014/main" id="{6278E60B-CF6D-40D7-B6DE-511B409224AC}"/>
+                <a16:creationId xmlns:a16="http://schemas.microsoft.com/office/drawing/2014/main" id="{5088A587-B5E5-4EEF-88A3-401608E70112}"/>
               </a:ext>
             </a:extLst>
           </p:cNvPr>
@@ -9489,14 +9536,12 @@
         </p:nvSpPr>
         <p:spPr/>
         <p:txBody>
-          <a:bodyPr>
-            <a:normAutofit fontScale="90000"/>
-          </a:bodyPr>
-          <a:lstStyle/>
-          <a:p>
-            <a:r>
-              <a:rPr lang="en-US" dirty="0"/>
-              <a:t>Additional Program Root CNA Rules (1 of 2)</a:t>
+          <a:bodyPr/>
+          <a:lstStyle/>
+          <a:p>
+            <a:r>
+              <a:rPr lang="en-US" dirty="0"/>
+              <a:t>Additional Root CNA Rules (2 of 2)</a:t>
             </a:r>
           </a:p>
         </p:txBody>
@@ -9506,7 +9551,7 @@
           <p:cNvPr id="3" name="Content Placeholder 2">
             <a:extLst>
               <a:ext uri="{FF2B5EF4-FFF2-40B4-BE49-F238E27FC236}">
-                <a16:creationId xmlns:a16="http://schemas.microsoft.com/office/drawing/2014/main" id="{13BBB940-9712-4828-98DB-FADE804B3CD5}"/>
+                <a16:creationId xmlns:a16="http://schemas.microsoft.com/office/drawing/2014/main" id="{3513BE57-ABD0-4EAA-8A19-3C01E61A8F15}"/>
               </a:ext>
             </a:extLst>
           </p:cNvPr>
@@ -9520,91 +9565,69 @@
         <p:spPr/>
         <p:txBody>
           <a:bodyPr>
-            <a:normAutofit fontScale="85000" lnSpcReduction="20000"/>
+            <a:normAutofit lnSpcReduction="10000"/>
           </a:bodyPr>
           <a:lstStyle/>
           <a:p>
-            <a:r>
-              <a:rPr lang="en-US" dirty="0"/>
-              <a:t>In addition to following the afore mentioned rules, the Program Root CNA must perform the following functions:</a:t>
-            </a:r>
-          </a:p>
-          <a:p>
             <a:pPr lvl="1"/>
             <a:r>
               <a:rPr lang="en-US" dirty="0"/>
-              <a:t>Assignment Rules</a:t>
+              <a:t>Administration Rules</a:t>
             </a:r>
           </a:p>
           <a:p>
             <a:pPr lvl="2"/>
             <a:r>
               <a:rPr lang="en-US" dirty="0"/>
-              <a:t>Provide CVE ID blocks to Root CNAs</a:t>
+              <a:t>Accept metrics reports from Sub-CNAs; the format and instructions for sending metrics are determined by the Root CNA</a:t>
             </a:r>
           </a:p>
           <a:p>
             <a:pPr lvl="2"/>
             <a:r>
               <a:rPr lang="en-US" dirty="0"/>
-              <a:t>Maintain the CVE List and provide that information to the public</a:t>
+              <a:t>Submit metrics from Sub-CNAs quarterly, within two weeks of the quarter, to the Program Root CNA; quarters are based on the calendar year</a:t>
             </a:r>
           </a:p>
           <a:p>
             <a:pPr lvl="2"/>
             <a:r>
               <a:rPr lang="en-US" dirty="0"/>
-              <a:t>Assign CVE IDs as a CNA when necessary, per the CVE counting rules, when no Root CNAs cover that scope </a:t>
+              <a:t>Act as an escalation and adjudication point for issue resolution for Sub-CNAs in its domain </a:t>
             </a:r>
           </a:p>
           <a:p>
             <a:pPr lvl="2"/>
             <a:r>
               <a:rPr lang="en-US" dirty="0"/>
-              <a:t>Act as the CNA of last resort for assignment issues that require escalation</a:t>
-            </a:r>
-          </a:p>
-          <a:p>
-            <a:pPr lvl="1"/>
-            <a:r>
-              <a:rPr lang="en-US" dirty="0"/>
-              <a:t>Communications Rules</a:t>
+              <a:t>When appropriate, apply sanctions upon any Sub-CNAs within its domain and notify the Program Root CNA; the application of sanctions should occur as a last resort</a:t>
             </a:r>
           </a:p>
           <a:p>
             <a:pPr lvl="2"/>
             <a:r>
               <a:rPr lang="en-US" dirty="0"/>
-              <a:t>Provide a listing of all Root CNAs and Sub-CNAs, including public points of contact and web links; obtain this information from Root CNAs</a:t>
+              <a:t>Facilitate the enforcement of any administrative actions taken by the Program Root CNA against a Sub-CNA</a:t>
             </a:r>
           </a:p>
           <a:p>
             <a:pPr lvl="2"/>
             <a:r>
               <a:rPr lang="en-US" dirty="0"/>
-              <a:t>Maintain a private list of individual POCs for each Root and Sub-CNA for use by CNAs only</a:t>
+              <a:t>Follow the CNA Candidate Process described in Section 4 of the </a:t>
+            </a:r>
+            <a:r>
+              <a:rPr lang="en-US" i="1" dirty="0"/>
+              <a:t>CNA Rules</a:t>
+            </a:r>
+            <a:r>
+              <a:rPr lang="en-US" dirty="0"/>
+              <a:t> when adding new Sub-CNAs</a:t>
             </a:r>
           </a:p>
           <a:p>
             <a:pPr lvl="2"/>
-            <a:r>
-              <a:rPr lang="en-US" dirty="0"/>
-              <a:t>Provide coordination of communication channels between Root CNAs</a:t>
-            </a:r>
-          </a:p>
-          <a:p>
-            <a:pPr lvl="2"/>
-            <a:r>
-              <a:rPr lang="en-US" dirty="0"/>
-              <a:t>Respond to inquiries by Root CNAs and Sub-CNAs in a timely manner; establish responsiveness metrics for such responsiveness</a:t>
-            </a:r>
-          </a:p>
-          <a:p>
-            <a:pPr lvl="2"/>
-            <a:r>
-              <a:rPr lang="en-US" dirty="0"/>
-              <a:t>Maintain a public listing of the established counting rules for the CVE Program</a:t>
-            </a:r>
+            <a:endParaRPr lang="en-US" dirty="0"/>
           </a:p>
           <a:p>
             <a:pPr lvl="2"/>
@@ -9615,7 +9638,7 @@
     </p:spTree>
     <p:extLst>
       <p:ext uri="{BB962C8B-B14F-4D97-AF65-F5344CB8AC3E}">
-        <p14:creationId xmlns:p14="http://schemas.microsoft.com/office/powerpoint/2010/main" val="1065196756"/>
+        <p14:creationId xmlns:p14="http://schemas.microsoft.com/office/powerpoint/2010/main" val="2446127787"/>
       </p:ext>
     </p:extLst>
   </p:cSld>
@@ -9647,7 +9670,7 @@
           <p:cNvPr id="2" name="Title 1">
             <a:extLst>
               <a:ext uri="{FF2B5EF4-FFF2-40B4-BE49-F238E27FC236}">
-                <a16:creationId xmlns:a16="http://schemas.microsoft.com/office/drawing/2014/main" id="{9C8A8935-EFD7-489B-92D1-D337BAFC458A}"/>
+                <a16:creationId xmlns:a16="http://schemas.microsoft.com/office/drawing/2014/main" id="{6278E60B-CF6D-40D7-B6DE-511B409224AC}"/>
               </a:ext>
             </a:extLst>
           </p:cNvPr>
@@ -9667,7 +9690,7 @@
           <a:p>
             <a:r>
               <a:rPr lang="en-US" dirty="0"/>
-              <a:t>Additional Program Root CNA Rules (2 of 2)</a:t>
+              <a:t>Additional Program Root CNA Rules (1 of 2)</a:t>
             </a:r>
           </a:p>
         </p:txBody>
@@ -9677,7 +9700,7 @@
           <p:cNvPr id="3" name="Content Placeholder 2">
             <a:extLst>
               <a:ext uri="{FF2B5EF4-FFF2-40B4-BE49-F238E27FC236}">
-                <a16:creationId xmlns:a16="http://schemas.microsoft.com/office/drawing/2014/main" id="{745A70A4-068B-4BEF-B02B-BCF8A8499CA8}"/>
+                <a16:creationId xmlns:a16="http://schemas.microsoft.com/office/drawing/2014/main" id="{13BBB940-9712-4828-98DB-FADE804B3CD5}"/>
               </a:ext>
             </a:extLst>
           </p:cNvPr>
@@ -9690,66 +9713,95 @@
         </p:nvSpPr>
         <p:spPr/>
         <p:txBody>
-          <a:bodyPr/>
-          <a:lstStyle/>
-          <a:p>
-            <a:r>
-              <a:rPr lang="en-US" dirty="0"/>
-              <a:t>Administration Rules</a:t>
+          <a:bodyPr>
+            <a:normAutofit fontScale="85000" lnSpcReduction="20000"/>
+          </a:bodyPr>
+          <a:lstStyle/>
+          <a:p>
+            <a:r>
+              <a:rPr lang="en-US" dirty="0"/>
+              <a:t>In addition to following the afore mentioned rules, the Program Root CNA must perform the following functions:</a:t>
             </a:r>
           </a:p>
           <a:p>
             <a:pPr lvl="1"/>
             <a:r>
               <a:rPr lang="en-US" dirty="0"/>
-              <a:t>Serve as a member, and the Board moderator, of the CVE Board</a:t>
+              <a:t>Assignment Rules</a:t>
+            </a:r>
+          </a:p>
+          <a:p>
+            <a:pPr lvl="2"/>
+            <a:r>
+              <a:rPr lang="en-US" dirty="0"/>
+              <a:t>Provide CVE ID blocks to Root CNAs</a:t>
+            </a:r>
+          </a:p>
+          <a:p>
+            <a:pPr lvl="2"/>
+            <a:r>
+              <a:rPr lang="en-US" dirty="0"/>
+              <a:t>Maintain the CVE List and provide that information to the public</a:t>
+            </a:r>
+          </a:p>
+          <a:p>
+            <a:pPr lvl="2"/>
+            <a:r>
+              <a:rPr lang="en-US" dirty="0"/>
+              <a:t>Assign CVE IDs as a CNA when necessary, per the CVE counting rules, when no Root CNAs cover that scope </a:t>
+            </a:r>
+          </a:p>
+          <a:p>
+            <a:pPr lvl="2"/>
+            <a:r>
+              <a:rPr lang="en-US" dirty="0"/>
+              <a:t>Act as the CNA of last resort for assignment issues that require escalation</a:t>
             </a:r>
           </a:p>
           <a:p>
             <a:pPr lvl="1"/>
             <a:r>
               <a:rPr lang="en-US" dirty="0"/>
-              <a:t>Accept metrics reports from Root CNAs quarterly, within one month of the calendar quarter</a:t>
-            </a:r>
-          </a:p>
-          <a:p>
-            <a:pPr lvl="1"/>
-            <a:r>
-              <a:rPr lang="en-US" dirty="0"/>
-              <a:t>Act as the final arbiter for appeals regarding CNA assignment decisions and CNA program issues</a:t>
-            </a:r>
-          </a:p>
-          <a:p>
-            <a:pPr lvl="1"/>
-            <a:r>
-              <a:rPr lang="en-US" dirty="0"/>
-              <a:t>Act as an escalation point for issue resolution should this process fail at the Root CNA level</a:t>
-            </a:r>
-          </a:p>
-          <a:p>
-            <a:pPr lvl="1"/>
-            <a:r>
-              <a:rPr lang="en-US" dirty="0"/>
-              <a:t>When appropriate, apply sanctions upon any CNA</a:t>
-            </a:r>
-          </a:p>
-          <a:p>
-            <a:pPr lvl="1"/>
-            <a:r>
-              <a:rPr lang="en-US" dirty="0"/>
-              <a:t>Follow the CNA Candidate Process described in Section 4 of the </a:t>
-            </a:r>
-            <a:r>
-              <a:rPr lang="en-US" i="1" dirty="0"/>
-              <a:t>CNA Rules </a:t>
-            </a:r>
-            <a:r>
-              <a:rPr lang="en-US" dirty="0"/>
-              <a:t>when adding new Root CNAs</a:t>
-            </a:r>
-          </a:p>
-          <a:p>
-            <a:pPr lvl="1"/>
+              <a:t>Communications Rules</a:t>
+            </a:r>
+          </a:p>
+          <a:p>
+            <a:pPr lvl="2"/>
+            <a:r>
+              <a:rPr lang="en-US" dirty="0"/>
+              <a:t>Provide a listing of all Root CNAs and Sub-CNAs, including public points of contact and web links; obtain this information from Root CNAs</a:t>
+            </a:r>
+          </a:p>
+          <a:p>
+            <a:pPr lvl="2"/>
+            <a:r>
+              <a:rPr lang="en-US" dirty="0"/>
+              <a:t>Maintain a private list of individual POCs for each Root and Sub-CNA for use by CNAs only</a:t>
+            </a:r>
+          </a:p>
+          <a:p>
+            <a:pPr lvl="2"/>
+            <a:r>
+              <a:rPr lang="en-US" dirty="0"/>
+              <a:t>Provide coordination of communication channels between Root CNAs</a:t>
+            </a:r>
+          </a:p>
+          <a:p>
+            <a:pPr lvl="2"/>
+            <a:r>
+              <a:rPr lang="en-US" dirty="0"/>
+              <a:t>Respond to inquiries by Root CNAs and Sub-CNAs in a timely manner; establish responsiveness metrics for such responsiveness</a:t>
+            </a:r>
+          </a:p>
+          <a:p>
+            <a:pPr lvl="2"/>
+            <a:r>
+              <a:rPr lang="en-US" dirty="0"/>
+              <a:t>Maintain a public listing of the established counting rules for the CVE Program</a:t>
+            </a:r>
+          </a:p>
+          <a:p>
+            <a:pPr lvl="2"/>
             <a:endParaRPr lang="en-US" dirty="0"/>
           </a:p>
         </p:txBody>
@@ -9757,7 +9809,7 @@
     </p:spTree>
     <p:extLst>
       <p:ext uri="{BB962C8B-B14F-4D97-AF65-F5344CB8AC3E}">
-        <p14:creationId xmlns:p14="http://schemas.microsoft.com/office/powerpoint/2010/main" val="3127293214"/>
+        <p14:creationId xmlns:p14="http://schemas.microsoft.com/office/powerpoint/2010/main" val="1065196756"/>
       </p:ext>
     </p:extLst>
   </p:cSld>
@@ -9915,6 +9967,148 @@
 </file>
 
 <file path=ppt/slides/slide40.xml><?xml version="1.0" encoding="utf-8"?>
+<p:sld xmlns:a="http://schemas.openxmlformats.org/drawingml/2006/main" xmlns:r="http://schemas.openxmlformats.org/officeDocument/2006/relationships" xmlns:p="http://schemas.openxmlformats.org/presentationml/2006/main">
+  <p:cSld>
+    <p:spTree>
+      <p:nvGrpSpPr>
+        <p:cNvPr id="1" name=""/>
+        <p:cNvGrpSpPr/>
+        <p:nvPr/>
+      </p:nvGrpSpPr>
+      <p:grpSpPr>
+        <a:xfrm>
+          <a:off x="0" y="0"/>
+          <a:ext cx="0" cy="0"/>
+          <a:chOff x="0" y="0"/>
+          <a:chExt cx="0" cy="0"/>
+        </a:xfrm>
+      </p:grpSpPr>
+      <p:sp>
+        <p:nvSpPr>
+          <p:cNvPr id="2" name="Title 1">
+            <a:extLst>
+              <a:ext uri="{FF2B5EF4-FFF2-40B4-BE49-F238E27FC236}">
+                <a16:creationId xmlns:a16="http://schemas.microsoft.com/office/drawing/2014/main" id="{9C8A8935-EFD7-489B-92D1-D337BAFC458A}"/>
+              </a:ext>
+            </a:extLst>
+          </p:cNvPr>
+          <p:cNvSpPr>
+            <a:spLocks noGrp="1"/>
+          </p:cNvSpPr>
+          <p:nvPr>
+            <p:ph type="title"/>
+          </p:nvPr>
+        </p:nvSpPr>
+        <p:spPr/>
+        <p:txBody>
+          <a:bodyPr>
+            <a:normAutofit fontScale="90000"/>
+          </a:bodyPr>
+          <a:lstStyle/>
+          <a:p>
+            <a:r>
+              <a:rPr lang="en-US" dirty="0"/>
+              <a:t>Additional Program Root CNA Rules (2 of 2)</a:t>
+            </a:r>
+          </a:p>
+        </p:txBody>
+      </p:sp>
+      <p:sp>
+        <p:nvSpPr>
+          <p:cNvPr id="3" name="Content Placeholder 2">
+            <a:extLst>
+              <a:ext uri="{FF2B5EF4-FFF2-40B4-BE49-F238E27FC236}">
+                <a16:creationId xmlns:a16="http://schemas.microsoft.com/office/drawing/2014/main" id="{745A70A4-068B-4BEF-B02B-BCF8A8499CA8}"/>
+              </a:ext>
+            </a:extLst>
+          </p:cNvPr>
+          <p:cNvSpPr>
+            <a:spLocks noGrp="1"/>
+          </p:cNvSpPr>
+          <p:nvPr>
+            <p:ph idx="1"/>
+          </p:nvPr>
+        </p:nvSpPr>
+        <p:spPr/>
+        <p:txBody>
+          <a:bodyPr/>
+          <a:lstStyle/>
+          <a:p>
+            <a:r>
+              <a:rPr lang="en-US" dirty="0"/>
+              <a:t>Administration Rules</a:t>
+            </a:r>
+          </a:p>
+          <a:p>
+            <a:pPr lvl="1"/>
+            <a:r>
+              <a:rPr lang="en-US" dirty="0"/>
+              <a:t>Serve as a member, and the Board moderator, of the CVE Board</a:t>
+            </a:r>
+          </a:p>
+          <a:p>
+            <a:pPr lvl="1"/>
+            <a:r>
+              <a:rPr lang="en-US" dirty="0"/>
+              <a:t>Accept metrics reports from Root CNAs quarterly, within one month of the calendar quarter</a:t>
+            </a:r>
+          </a:p>
+          <a:p>
+            <a:pPr lvl="1"/>
+            <a:r>
+              <a:rPr lang="en-US" dirty="0"/>
+              <a:t>Act as the final arbiter for appeals regarding CNA assignment decisions and CNA program issues</a:t>
+            </a:r>
+          </a:p>
+          <a:p>
+            <a:pPr lvl="1"/>
+            <a:r>
+              <a:rPr lang="en-US" dirty="0"/>
+              <a:t>Act as an escalation point for issue resolution should this process fail at the Root CNA level</a:t>
+            </a:r>
+          </a:p>
+          <a:p>
+            <a:pPr lvl="1"/>
+            <a:r>
+              <a:rPr lang="en-US" dirty="0"/>
+              <a:t>When appropriate, apply sanctions upon any CNA</a:t>
+            </a:r>
+          </a:p>
+          <a:p>
+            <a:pPr lvl="1"/>
+            <a:r>
+              <a:rPr lang="en-US" dirty="0"/>
+              <a:t>Follow the CNA Candidate Process described in Section 4 of the </a:t>
+            </a:r>
+            <a:r>
+              <a:rPr lang="en-US" i="1" dirty="0"/>
+              <a:t>CNA Rules </a:t>
+            </a:r>
+            <a:r>
+              <a:rPr lang="en-US" dirty="0"/>
+              <a:t>when adding new Root CNAs</a:t>
+            </a:r>
+          </a:p>
+          <a:p>
+            <a:pPr lvl="1"/>
+            <a:endParaRPr lang="en-US" dirty="0"/>
+          </a:p>
+        </p:txBody>
+      </p:sp>
+    </p:spTree>
+    <p:extLst>
+      <p:ext uri="{BB962C8B-B14F-4D97-AF65-F5344CB8AC3E}">
+        <p14:creationId xmlns:p14="http://schemas.microsoft.com/office/powerpoint/2010/main" val="3127293214"/>
+      </p:ext>
+    </p:extLst>
+  </p:cSld>
+  <p:clrMapOvr>
+    <a:masterClrMapping/>
+  </p:clrMapOvr>
+</p:sld>
+</file>
+
+<file path=ppt/slides/slide41.xml><?xml version="1.0" encoding="utf-8"?>
 <p:sld xmlns:a="http://schemas.openxmlformats.org/drawingml/2006/main" xmlns:r="http://schemas.openxmlformats.org/officeDocument/2006/relationships" xmlns:p="http://schemas.openxmlformats.org/presentationml/2006/main">
   <p:cSld>
     <p:spTree>
@@ -11304,6 +11498,16 @@
 
 <file path=customXml/item1.xml><?xml version="1.0" encoding="utf-8"?>
 <?mso-contentType ?>
+<customXsn xmlns="http://schemas.microsoft.com/office/2006/metadata/customXsn">
+  <xsnLocation/>
+  <cached>True</cached>
+  <openByDefault>True</openByDefault>
+  <xsnScope/>
+</customXsn>
+</file>
+
+<file path=customXml/item2.xml><?xml version="1.0" encoding="utf-8"?>
+<?mso-contentType ?>
 <FormTemplates xmlns="http://schemas.microsoft.com/sharepoint/v3/contenttype/forms">
   <Display>DocumentLibraryForm</Display>
   <Edit>DocumentLibraryForm</Edit>
@@ -11311,7 +11515,7 @@
 </FormTemplates>
 </file>
 
-<file path=customXml/item2.xml><?xml version="1.0" encoding="utf-8"?>
+<file path=customXml/item3.xml><?xml version="1.0" encoding="utf-8"?>
 <ct:contentTypeSchema xmlns:ct="http://schemas.microsoft.com/office/2006/metadata/contentType" xmlns:ma="http://schemas.microsoft.com/office/2006/metadata/properties/metaAttributes" ct:_="" ma:_="" ma:contentTypeName="MITRE Work" ma:contentTypeID="0x010100823A99C636F7423283FB0D200866C613006635D4F535B0564BA1CF28EBA6D51C69" ma:contentTypeVersion="4" ma:contentTypeDescription="Materials and documents that contain MITRE authored content and other content directly attributable to MITRE and its work" ma:contentTypeScope="" ma:versionID="a0e8e30c96128f2f9f4cf73e52721af3">
   <xsd:schema xmlns:xsd="http://www.w3.org/2001/XMLSchema" xmlns:xs="http://www.w3.org/2001/XMLSchema" xmlns:p="http://schemas.microsoft.com/office/2006/metadata/properties" xmlns:ns1="http://schemas.microsoft.com/sharepoint/v3" xmlns:ns2="http://schemas.microsoft.com/sharepoint/v3/fields" targetNamespace="http://schemas.microsoft.com/office/2006/metadata/properties" ma:root="true" ma:fieldsID="4ecced815c1fcad0d6ce5c0941b6b895" ns1:_="" ns2:_="">
     <xsd:import namespace="http://schemas.microsoft.com/sharepoint/v3"/>
@@ -11475,7 +11679,7 @@
 </ct:contentTypeSchema>
 </file>
 
-<file path=customXml/item3.xml><?xml version="1.0" encoding="utf-8"?>
+<file path=customXml/item4.xml><?xml version="1.0" encoding="utf-8"?>
 <p:properties xmlns:p="http://schemas.microsoft.com/office/2006/metadata/properties" xmlns:xsi="http://www.w3.org/2001/XMLSchema-instance" xmlns:pc="http://schemas.microsoft.com/office/infopath/2007/PartnerControls">
   <documentManagement>
     <MITRE_x0020_Sensitivity xmlns="http://schemas.microsoft.com/sharepoint/v3">Internal MITRE Information</MITRE_x0020_Sensitivity>
@@ -11485,17 +11689,15 @@
 </p:properties>
 </file>
 
-<file path=customXml/item4.xml><?xml version="1.0" encoding="utf-8"?>
-<?mso-contentType ?>
-<customXsn xmlns="http://schemas.microsoft.com/office/2006/metadata/customXsn">
-  <xsnLocation/>
-  <cached>True</cached>
-  <openByDefault>True</openByDefault>
-  <xsnScope/>
-</customXsn>
+<file path=customXml/itemProps1.xml><?xml version="1.0" encoding="utf-8"?>
+<ds:datastoreItem xmlns:ds="http://schemas.openxmlformats.org/officeDocument/2006/customXml" ds:itemID="{DA4BE8BC-21DD-494E-8FAB-B2E9DD91F2E2}">
+  <ds:schemaRefs>
+    <ds:schemaRef ds:uri="http://schemas.microsoft.com/office/2006/metadata/customXsn"/>
+  </ds:schemaRefs>
+</ds:datastoreItem>
 </file>
 
-<file path=customXml/itemProps1.xml><?xml version="1.0" encoding="utf-8"?>
+<file path=customXml/itemProps2.xml><?xml version="1.0" encoding="utf-8"?>
 <ds:datastoreItem xmlns:ds="http://schemas.openxmlformats.org/officeDocument/2006/customXml" ds:itemID="{7B6B16B2-404F-4040-9CA3-AFE4C0590207}">
   <ds:schemaRefs>
     <ds:schemaRef ds:uri="http://schemas.microsoft.com/sharepoint/v3/contenttype/forms"/>
@@ -11503,7 +11705,7 @@
 </ds:datastoreItem>
 </file>
 
-<file path=customXml/itemProps2.xml><?xml version="1.0" encoding="utf-8"?>
+<file path=customXml/itemProps3.xml><?xml version="1.0" encoding="utf-8"?>
 <ds:datastoreItem xmlns:ds="http://schemas.openxmlformats.org/officeDocument/2006/customXml" ds:itemID="{8796BF26-5B75-4DC2-9FF6-CB071673E3E7}">
   <ds:schemaRefs>
     <ds:schemaRef ds:uri="http://schemas.microsoft.com/office/2006/metadata/contentType"/>
@@ -11522,7 +11724,7 @@
 </ds:datastoreItem>
 </file>
 
-<file path=customXml/itemProps3.xml><?xml version="1.0" encoding="utf-8"?>
+<file path=customXml/itemProps4.xml><?xml version="1.0" encoding="utf-8"?>
 <ds:datastoreItem xmlns:ds="http://schemas.openxmlformats.org/officeDocument/2006/customXml" ds:itemID="{760E1BCA-B7C8-4D5D-A2B9-87067345F3DD}">
   <ds:schemaRefs>
     <ds:schemaRef ds:uri="http://purl.org/dc/dcmitype/"/>
@@ -11537,12 +11739,4 @@
     <ds:schemaRef ds:uri="http://purl.org/dc/terms/"/>
   </ds:schemaRefs>
 </ds:datastoreItem>
-</file>
-
-<file path=customXml/itemProps4.xml><?xml version="1.0" encoding="utf-8"?>
-<ds:datastoreItem xmlns:ds="http://schemas.openxmlformats.org/officeDocument/2006/customXml" ds:itemID="{DA4BE8BC-21DD-494E-8FAB-B2E9DD91F2E2}">
-  <ds:schemaRefs>
-    <ds:schemaRef ds:uri="http://schemas.microsoft.com/office/2006/metadata/customXsn"/>
-  </ds:schemaRefs>
-</ds:datastoreItem>
 </file>
</xml_diff>